<commit_message>
refactoring lesson order: Graph before Regex
</commit_message>
<xml_diff>
--- a/docs/slides/01/01_intro.pptx
+++ b/docs/slides/01/01_intro.pptx
@@ -2176,7 +2176,7 @@
           </a:ln>
           <a:extLst>
             <a:ext uri="{C572A759-6A51-4108-AA02-DFA0A04FC94B}">
-              <ma14:wrappingTextBoxFlag xmlns:ma14="http://schemas.microsoft.com/office/mac/drawingml/2011/main" val="1"/>
+              <ma14:wrappingTextBoxFlag xmlns:ma14="http://schemas.microsoft.com/office/mac/drawingml/2011/main" xmlns="" val="1"/>
             </a:ext>
           </a:extLst>
         </p:spPr>
@@ -2215,7 +2215,7 @@
           </a:ln>
           <a:extLst>
             <a:ext uri="{C572A759-6A51-4108-AA02-DFA0A04FC94B}">
-              <ma14:wrappingTextBoxFlag xmlns:ma14="http://schemas.microsoft.com/office/mac/drawingml/2011/main" val="1"/>
+              <ma14:wrappingTextBoxFlag xmlns:ma14="http://schemas.microsoft.com/office/mac/drawingml/2011/main" xmlns="" val="1"/>
             </a:ext>
           </a:extLst>
         </p:spPr>
@@ -3358,23 +3358,7 @@
           <a:p>
             <a:r>
               <a:rPr lang="en-US" dirty="0" smtClean="0"/>
-              <a:t>I like math, but, in contrast to </a:t>
-            </a:r>
-            <a:r>
-              <a:rPr lang="en-US" dirty="0" smtClean="0"/>
-              <a:t>lecturers </a:t>
-            </a:r>
-            <a:r>
-              <a:rPr lang="en-US" dirty="0" smtClean="0"/>
-              <a:t>of previous </a:t>
-            </a:r>
-            <a:r>
-              <a:rPr lang="en-US" dirty="0" smtClean="0"/>
-              <a:t>years or in other universities, I </a:t>
-            </a:r>
-            <a:r>
-              <a:rPr lang="en-US" dirty="0" smtClean="0"/>
-              <a:t>put more emphasis on the programming side…</a:t>
+              <a:t>I like math, but, in contrast to lecturers of previous years or in other universities, I put more emphasis on the programming side…</a:t>
             </a:r>
           </a:p>
           <a:p>
@@ -3779,6 +3763,10 @@
           </p:nvPr>
         </p:nvSpPr>
         <p:spPr>
+          <a:xfrm>
+            <a:off x="395926" y="2603500"/>
+            <a:ext cx="12292552" cy="6286500"/>
+          </a:xfrm>
           <a:prstGeom prst="rect">
             <a:avLst/>
           </a:prstGeom>
@@ -3789,11 +3777,7 @@
           <a:p>
             <a:r>
               <a:rPr lang="en-US" dirty="0" smtClean="0"/>
-              <a:t>3 hour written </a:t>
-            </a:r>
-            <a:r>
-              <a:rPr lang="en-US" dirty="0" smtClean="0"/>
-              <a:t>exam</a:t>
+              <a:t>3 hour written exam</a:t>
             </a:r>
           </a:p>
           <a:p>
@@ -3806,29 +3790,49 @@
             <a:pPr lvl="1"/>
             <a:r>
               <a:rPr lang="en-US" dirty="0" smtClean="0"/>
-              <a:t>1 per “Foundation” lesson (so 8), and 2 from the “Advanced” topic</a:t>
-            </a:r>
+              <a:t>1 per “Foundation” lesson (so </a:t>
+            </a:r>
+            <a:r>
+              <a:rPr lang="en-US" dirty="0" smtClean="0"/>
+              <a:t>9), </a:t>
+            </a:r>
+            <a:r>
+              <a:rPr lang="en-US" dirty="0" smtClean="0"/>
+              <a:t>and </a:t>
+            </a:r>
+            <a:r>
+              <a:rPr lang="en-US" dirty="0" smtClean="0"/>
+              <a:t>1 </a:t>
+            </a:r>
+            <a:r>
+              <a:rPr lang="en-US" dirty="0" smtClean="0"/>
+              <a:t>from the “Advanced” </a:t>
+            </a:r>
+            <a:r>
+              <a:rPr lang="en-US" dirty="0" smtClean="0"/>
+              <a:t>topics</a:t>
+            </a:r>
+            <a:endParaRPr lang="en-US" dirty="0" smtClean="0"/>
           </a:p>
           <a:p>
             <a:pPr lvl="1"/>
             <a:r>
               <a:rPr lang="en-US" dirty="0" smtClean="0"/>
-              <a:t>Note: this might change in the actual exam</a:t>
-            </a:r>
-            <a:endParaRPr lang="en-US" dirty="0" smtClean="0"/>
-          </a:p>
-          <a:p>
-            <a:r>
-              <a:rPr lang="en-US" dirty="0" smtClean="0"/>
-              <a:t>Expect </a:t>
-            </a:r>
-            <a:r>
-              <a:rPr lang="en-US" dirty="0" smtClean="0"/>
-              <a:t>theoretical questions and also the writing of code on </a:t>
-            </a:r>
-            <a:r>
-              <a:rPr lang="en-US" dirty="0" smtClean="0"/>
-              <a:t>paper</a:t>
+              <a:t>Note: </a:t>
+            </a:r>
+            <a:r>
+              <a:rPr lang="en-US" i="1" dirty="0" smtClean="0"/>
+              <a:t>this might change in the actual exam</a:t>
+            </a:r>
+          </a:p>
+          <a:p>
+            <a:r>
+              <a:rPr lang="en-US" dirty="0" smtClean="0"/>
+              <a:t>Expect theoretical questions and also the writing of code on </a:t>
+            </a:r>
+            <a:r>
+              <a:rPr lang="en-US" dirty="0" smtClean="0"/>
+              <a:t>paper (at least 1, but no more than 5)</a:t>
             </a:r>
             <a:endParaRPr dirty="0" smtClean="0"/>
           </a:p>
@@ -4253,11 +4257,7 @@
             </a:r>
             <a:r>
               <a:rPr sz="4400" dirty="0" smtClean="0"/>
-              <a:t>or </a:t>
-            </a:r>
-            <a:r>
-              <a:rPr sz="4400" dirty="0" smtClean="0"/>
-              <a:t>announcements, and questions of general interest for the whole class</a:t>
+              <a:t>or announcements, and questions of general interest for the whole class</a:t>
             </a:r>
             <a:endParaRPr lang="en-US" sz="4400" dirty="0" smtClean="0"/>
           </a:p>
@@ -4272,11 +4272,7 @@
             </a:r>
             <a:r>
               <a:rPr lang="en-US" sz="4400" dirty="0" smtClean="0"/>
-              <a:t> sending me </a:t>
-            </a:r>
-            <a:r>
-              <a:rPr lang="en-US" sz="4400" dirty="0" smtClean="0"/>
-              <a:t>emails</a:t>
+              <a:t> sending me emails</a:t>
             </a:r>
           </a:p>
           <a:p>
@@ -4569,18 +4565,18 @@
             </a:r>
             <a:r>
               <a:rPr dirty="0" smtClean="0"/>
-              <a:t>a </a:t>
-            </a:r>
-            <a:r>
-              <a:rPr dirty="0" smtClean="0"/>
-              <a:t>weak</a:t>
+              <a:t>a weak</a:t>
             </a:r>
             <a:endParaRPr lang="en-US" dirty="0" smtClean="0"/>
           </a:p>
           <a:p>
             <a:r>
               <a:rPr lang="en-US" dirty="0" smtClean="0"/>
-              <a:t>Class 1-8: </a:t>
+              <a:t>Class </a:t>
+            </a:r>
+            <a:r>
+              <a:rPr lang="en-US" dirty="0" smtClean="0"/>
+              <a:t>1-9: </a:t>
             </a:r>
             <a:r>
               <a:rPr lang="en-US" i="1" dirty="0" smtClean="0"/>
@@ -4588,13 +4584,29 @@
             </a:r>
             <a:r>
               <a:rPr lang="en-US" dirty="0" smtClean="0"/>
-              <a:t>, algorithms and data structure that all of you will need to know if you are going to work as a developer</a:t>
-            </a:r>
-          </a:p>
-          <a:p>
-            <a:r>
-              <a:rPr lang="en-US" dirty="0" smtClean="0"/>
-              <a:t>Class 9-12: </a:t>
+              <a:t>, algorithms and data </a:t>
+            </a:r>
+            <a:r>
+              <a:rPr lang="en-US" dirty="0" smtClean="0"/>
+              <a:t>structures </a:t>
+            </a:r>
+            <a:r>
+              <a:rPr lang="en-US" dirty="0" smtClean="0"/>
+              <a:t>that all of you will need to know if you are going to work as a developer</a:t>
+            </a:r>
+          </a:p>
+          <a:p>
+            <a:r>
+              <a:rPr lang="en-US" dirty="0" smtClean="0"/>
+              <a:t>Class </a:t>
+            </a:r>
+            <a:r>
+              <a:rPr lang="en-US" dirty="0" smtClean="0"/>
+              <a:t>10-12</a:t>
+            </a:r>
+            <a:r>
+              <a:rPr lang="en-US" dirty="0" smtClean="0"/>
+              <a:t>: </a:t>
             </a:r>
             <a:r>
               <a:rPr lang="en-US" i="1" dirty="0" smtClean="0"/>
@@ -4604,7 +4616,6 @@
               <a:rPr lang="en-US" dirty="0" smtClean="0"/>
               <a:t>, interesting and important topics, but that not all of you will need in your daily jobs</a:t>
             </a:r>
-            <a:endParaRPr lang="en-US" dirty="0" smtClean="0"/>
           </a:p>
           <a:p>
             <a:r>
@@ -4707,7 +4718,7 @@
           <a:p>
             <a:pPr marL="742950" indent="-742950">
               <a:spcBef>
-                <a:spcPts val="2400"/>
+                <a:spcPts val="1200"/>
               </a:spcBef>
               <a:buFont typeface="+mj-lt"/>
               <a:buAutoNum type="arabicPeriod"/>
@@ -4720,7 +4731,7 @@
           <a:p>
             <a:pPr marL="742950" indent="-742950">
               <a:spcBef>
-                <a:spcPts val="2400"/>
+                <a:spcPts val="1200"/>
               </a:spcBef>
               <a:buFont typeface="+mj-lt"/>
               <a:buAutoNum type="arabicPeriod"/>
@@ -4733,7 +4744,7 @@
           <a:p>
             <a:pPr marL="742950" indent="-742950">
               <a:spcBef>
-                <a:spcPts val="2400"/>
+                <a:spcPts val="1200"/>
               </a:spcBef>
               <a:buFont typeface="+mj-lt"/>
               <a:buAutoNum type="arabicPeriod"/>
@@ -4746,7 +4757,7 @@
           <a:p>
             <a:pPr marL="742950" indent="-742950">
               <a:spcBef>
-                <a:spcPts val="2400"/>
+                <a:spcPts val="1200"/>
               </a:spcBef>
               <a:buFont typeface="+mj-lt"/>
               <a:buAutoNum type="arabicPeriod"/>
@@ -4759,7 +4770,7 @@
           <a:p>
             <a:pPr marL="742950" indent="-742950">
               <a:spcBef>
-                <a:spcPts val="2400"/>
+                <a:spcPts val="1200"/>
               </a:spcBef>
               <a:buFont typeface="+mj-lt"/>
               <a:buAutoNum type="arabicPeriod"/>
@@ -4772,7 +4783,7 @@
           <a:p>
             <a:pPr marL="742950" indent="-742950">
               <a:spcBef>
-                <a:spcPts val="2400"/>
+                <a:spcPts val="1200"/>
               </a:spcBef>
               <a:buFont typeface="+mj-lt"/>
               <a:buAutoNum type="arabicPeriod"/>
@@ -4785,7 +4796,7 @@
           <a:p>
             <a:pPr marL="742950" indent="-742950">
               <a:spcBef>
-                <a:spcPts val="2400"/>
+                <a:spcPts val="1200"/>
               </a:spcBef>
               <a:buFont typeface="+mj-lt"/>
               <a:buAutoNum type="arabicPeriod"/>
@@ -4798,16 +4809,28 @@
           <a:p>
             <a:pPr marL="742950" indent="-742950">
               <a:spcBef>
-                <a:spcPts val="2400"/>
+                <a:spcPts val="1200"/>
               </a:spcBef>
               <a:buFont typeface="+mj-lt"/>
               <a:buAutoNum type="arabicPeriod"/>
             </a:pPr>
             <a:r>
+              <a:rPr lang="en-US" dirty="0"/>
+              <a:t>Graphs</a:t>
+            </a:r>
+          </a:p>
+          <a:p>
+            <a:pPr marL="742950" indent="-742950">
+              <a:spcBef>
+                <a:spcPts val="1200"/>
+              </a:spcBef>
+              <a:buFont typeface="+mj-lt"/>
+              <a:buAutoNum type="arabicPeriod"/>
+            </a:pPr>
+            <a:r>
               <a:rPr lang="en-US" dirty="0" smtClean="0"/>
               <a:t>Regular Expressions</a:t>
             </a:r>
-            <a:endParaRPr lang="en-US" dirty="0" smtClean="0"/>
           </a:p>
         </p:txBody>
       </p:sp>
@@ -4821,7 +4844,7 @@
         </p:nvSpPr>
         <p:spPr>
           <a:xfrm>
-            <a:off x="7133741" y="2262753"/>
+            <a:off x="7133741" y="1838547"/>
             <a:ext cx="5667859" cy="4132020"/>
           </a:xfrm>
           <a:prstGeom prst="rect">
@@ -4832,7 +4855,7 @@
           </a:ln>
           <a:extLst>
             <a:ext uri="{C572A759-6A51-4108-AA02-DFA0A04FC94B}">
-              <ma14:wrappingTextBoxFlag xmlns:ma14="http://schemas.microsoft.com/office/mac/drawingml/2011/main" val="1"/>
+              <ma14:wrappingTextBoxFlag xmlns:ma14="http://schemas.microsoft.com/office/mac/drawingml/2011/main" xmlns="" val="1"/>
             </a:ext>
           </a:extLst>
         </p:spPr>
@@ -5109,12 +5132,17 @@
                 <a:spcPts val="2400"/>
               </a:spcBef>
               <a:buFont typeface="+mj-lt"/>
-              <a:buAutoNum type="arabicPeriod" startAt="9"/>
+              <a:buAutoNum type="arabicPeriod" startAt="10"/>
             </a:pPr>
             <a:r>
-              <a:rPr lang="en-US" dirty="0" smtClean="0"/>
-              <a:t>Optimization Algorithms</a:t>
-            </a:r>
+              <a:rPr lang="en-US" dirty="0"/>
+              <a:t>Optimization </a:t>
+            </a:r>
+            <a:r>
+              <a:rPr lang="en-US" dirty="0" smtClean="0"/>
+              <a:t>Algorithms</a:t>
+            </a:r>
+            <a:endParaRPr lang="en-US" dirty="0" smtClean="0"/>
           </a:p>
           <a:p>
             <a:pPr marL="742950" indent="-742950" hangingPunct="1">
@@ -5122,12 +5150,13 @@
                 <a:spcPts val="2400"/>
               </a:spcBef>
               <a:buFont typeface="+mj-lt"/>
-              <a:buAutoNum type="arabicPeriod" startAt="9"/>
+              <a:buAutoNum type="arabicPeriod" startAt="10"/>
             </a:pPr>
             <a:r>
               <a:rPr lang="en-US" dirty="0" smtClean="0"/>
               <a:t>Evolutionary Algorithms</a:t>
             </a:r>
+            <a:endParaRPr lang="en-US" dirty="0" smtClean="0"/>
           </a:p>
           <a:p>
             <a:pPr marL="742950" indent="-742950" hangingPunct="1">
@@ -5135,26 +5164,12 @@
                 <a:spcPts val="2400"/>
               </a:spcBef>
               <a:buFont typeface="+mj-lt"/>
-              <a:buAutoNum type="arabicPeriod" startAt="9"/>
+              <a:buAutoNum type="arabicPeriod" startAt="10"/>
             </a:pPr>
             <a:r>
               <a:rPr lang="en-US" dirty="0" smtClean="0"/>
-              <a:t>Graphs</a:t>
-            </a:r>
-          </a:p>
-          <a:p>
-            <a:pPr marL="742950" indent="-742950" hangingPunct="1">
-              <a:spcBef>
-                <a:spcPts val="2400"/>
-              </a:spcBef>
-              <a:buFont typeface="+mj-lt"/>
-              <a:buAutoNum type="arabicPeriod" startAt="9"/>
-            </a:pPr>
-            <a:r>
-              <a:rPr lang="en-US" dirty="0" smtClean="0"/>
               <a:t>Data Compression</a:t>
             </a:r>
-            <a:endParaRPr lang="en-US" dirty="0" smtClean="0"/>
           </a:p>
         </p:txBody>
       </p:sp>
@@ -5179,7 +5194,7 @@
           </a:ln>
           <a:extLst>
             <a:ext uri="{C572A759-6A51-4108-AA02-DFA0A04FC94B}">
-              <ma14:wrappingTextBoxFlag xmlns:ma14="http://schemas.microsoft.com/office/mac/drawingml/2011/main" val="1"/>
+              <ma14:wrappingTextBoxFlag xmlns:ma14="http://schemas.microsoft.com/office/mac/drawingml/2011/main" xmlns="" val="1"/>
             </a:ext>
           </a:extLst>
         </p:spPr>
@@ -5538,22 +5553,14 @@
             <a:pPr lvl="1"/>
             <a:r>
               <a:rPr lang="en-US" dirty="0" smtClean="0"/>
-              <a:t>2-3 </a:t>
-            </a:r>
-            <a:r>
-              <a:rPr lang="en-US" dirty="0" smtClean="0"/>
-              <a:t>hours of lecture: code and slides</a:t>
+              <a:t>2-3 hours of lecture: code and slides</a:t>
             </a:r>
           </a:p>
           <a:p>
             <a:pPr lvl="1"/>
             <a:r>
               <a:rPr lang="en-US" dirty="0" smtClean="0"/>
-              <a:t>1-2 </a:t>
-            </a:r>
-            <a:r>
-              <a:rPr lang="en-US" dirty="0" smtClean="0"/>
-              <a:t>hours in which you should do exercises and get help</a:t>
+              <a:t>1-2 hours in which you should do exercises and get help</a:t>
             </a:r>
           </a:p>
           <a:p>
@@ -5563,15 +5570,7 @@
             </a:r>
             <a:r>
               <a:rPr lang="en-US" dirty="0" smtClean="0"/>
-              <a:t>: the </a:t>
-            </a:r>
-            <a:r>
-              <a:rPr lang="en-US" dirty="0" smtClean="0"/>
-              <a:t>1-2 </a:t>
-            </a:r>
-            <a:r>
-              <a:rPr lang="en-US" dirty="0" smtClean="0"/>
-              <a:t>hours after lecture is not only for exercises. If you are falling behind, or you need some more revision, you can ask for my help on anything related to coding</a:t>
+              <a:t>: the 1-2 hours after lecture is not only for exercises. If you are falling behind, or you need some more revision, you can ask for my help on anything related to coding</a:t>
             </a:r>
           </a:p>
         </p:txBody>
@@ -5844,11 +5843,7 @@
             </a:r>
             <a:r>
               <a:rPr lang="en-US" dirty="0" smtClean="0"/>
-              <a:t>and corrections </a:t>
-            </a:r>
-            <a:r>
-              <a:rPr lang="en-US" dirty="0" smtClean="0"/>
-              <a:t>can</a:t>
+              <a:t>and corrections can</a:t>
             </a:r>
             <a:r>
               <a:rPr dirty="0" smtClean="0"/>

</xml_diff>

<commit_message>
fixed slides 1 and update to exercises
</commit_message>
<xml_diff>
--- a/docs/slides/01/01_intro.pptx
+++ b/docs/slides/01/01_intro.pptx
@@ -5,7 +5,7 @@
     <p:sldMasterId id="2147483648" r:id="rId1"/>
   </p:sldMasterIdLst>
   <p:notesMasterIdLst>
-    <p:notesMasterId r:id="rId33"/>
+    <p:notesMasterId r:id="rId34"/>
   </p:notesMasterIdLst>
   <p:sldIdLst>
     <p:sldId id="287" r:id="rId2"/>
@@ -27,18 +27,19 @@
     <p:sldId id="290" r:id="rId18"/>
     <p:sldId id="292" r:id="rId19"/>
     <p:sldId id="295" r:id="rId20"/>
-    <p:sldId id="296" r:id="rId21"/>
-    <p:sldId id="293" r:id="rId22"/>
-    <p:sldId id="291" r:id="rId23"/>
-    <p:sldId id="297" r:id="rId24"/>
-    <p:sldId id="298" r:id="rId25"/>
-    <p:sldId id="299" r:id="rId26"/>
-    <p:sldId id="301" r:id="rId27"/>
-    <p:sldId id="302" r:id="rId28"/>
-    <p:sldId id="300" r:id="rId29"/>
-    <p:sldId id="303" r:id="rId30"/>
-    <p:sldId id="304" r:id="rId31"/>
-    <p:sldId id="294" r:id="rId32"/>
+    <p:sldId id="305" r:id="rId21"/>
+    <p:sldId id="296" r:id="rId22"/>
+    <p:sldId id="293" r:id="rId23"/>
+    <p:sldId id="291" r:id="rId24"/>
+    <p:sldId id="297" r:id="rId25"/>
+    <p:sldId id="298" r:id="rId26"/>
+    <p:sldId id="299" r:id="rId27"/>
+    <p:sldId id="301" r:id="rId28"/>
+    <p:sldId id="302" r:id="rId29"/>
+    <p:sldId id="300" r:id="rId30"/>
+    <p:sldId id="303" r:id="rId31"/>
+    <p:sldId id="304" r:id="rId32"/>
+    <p:sldId id="294" r:id="rId33"/>
   </p:sldIdLst>
   <p:sldSz cx="13004800" cy="9753600"/>
   <p:notesSz cx="6858000" cy="9144000"/>
@@ -531,6 +532,67 @@
 </p:notesMaster>
 </file>
 
+<file path=ppt/notesSlides/notesSlide1.xml><?xml version="1.0" encoding="utf-8"?>
+<p:notes xmlns:a="http://schemas.openxmlformats.org/drawingml/2006/main" xmlns:r="http://schemas.openxmlformats.org/officeDocument/2006/relationships" xmlns:p="http://schemas.openxmlformats.org/presentationml/2006/main">
+  <p:cSld>
+    <p:spTree>
+      <p:nvGrpSpPr>
+        <p:cNvPr id="1" name=""/>
+        <p:cNvGrpSpPr/>
+        <p:nvPr/>
+      </p:nvGrpSpPr>
+      <p:grpSpPr>
+        <a:xfrm>
+          <a:off x="0" y="0"/>
+          <a:ext cx="0" cy="0"/>
+          <a:chOff x="0" y="0"/>
+          <a:chExt cx="0" cy="0"/>
+        </a:xfrm>
+      </p:grpSpPr>
+      <p:sp>
+        <p:nvSpPr>
+          <p:cNvPr id="2" name="Slide Image Placeholder 1"/>
+          <p:cNvSpPr>
+            <a:spLocks noGrp="1" noRot="1" noChangeAspect="1"/>
+          </p:cNvSpPr>
+          <p:nvPr>
+            <p:ph type="sldImg"/>
+          </p:nvPr>
+        </p:nvSpPr>
+        <p:spPr/>
+      </p:sp>
+      <p:sp>
+        <p:nvSpPr>
+          <p:cNvPr id="3" name="Notes Placeholder 2"/>
+          <p:cNvSpPr>
+            <a:spLocks noGrp="1"/>
+          </p:cNvSpPr>
+          <p:nvPr>
+            <p:ph type="body" idx="1"/>
+          </p:nvPr>
+        </p:nvSpPr>
+        <p:spPr/>
+        <p:txBody>
+          <a:bodyPr/>
+          <a:lstStyle/>
+          <a:p>
+            <a:endParaRPr lang="en-US" dirty="0"/>
+          </a:p>
+        </p:txBody>
+      </p:sp>
+    </p:spTree>
+    <p:extLst>
+      <p:ext uri="{BB962C8B-B14F-4D97-AF65-F5344CB8AC3E}">
+        <p14:creationId xmlns:p14="http://schemas.microsoft.com/office/powerpoint/2010/main" val="1690472366"/>
+      </p:ext>
+    </p:extLst>
+  </p:cSld>
+  <p:clrMapOvr>
+    <a:masterClrMapping/>
+  </p:clrMapOvr>
+</p:notes>
+</file>
+
 <file path=ppt/slideLayouts/slideLayout1.xml><?xml version="1.0" encoding="utf-8"?>
 <p:sldLayout xmlns:a="http://schemas.openxmlformats.org/drawingml/2006/main" xmlns:r="http://schemas.openxmlformats.org/officeDocument/2006/relationships" xmlns:p="http://schemas.openxmlformats.org/presentationml/2006/main" type="title">
   <p:cSld name="Title &amp; Subtitle">
@@ -2186,7 +2248,7 @@
           </a:ln>
           <a:extLst>
             <a:ext uri="{C572A759-6A51-4108-AA02-DFA0A04FC94B}">
-              <ma14:wrappingTextBoxFlag xmlns:ma14="http://schemas.microsoft.com/office/mac/drawingml/2011/main" xmlns="" val="1"/>
+              <ma14:wrappingTextBoxFlag xmlns="" xmlns:ma14="http://schemas.microsoft.com/office/mac/drawingml/2011/main" val="1"/>
             </a:ext>
           </a:extLst>
         </p:spPr>
@@ -2225,7 +2287,7 @@
           </a:ln>
           <a:extLst>
             <a:ext uri="{C572A759-6A51-4108-AA02-DFA0A04FC94B}">
-              <ma14:wrappingTextBoxFlag xmlns:ma14="http://schemas.microsoft.com/office/mac/drawingml/2011/main" xmlns="" val="1"/>
+              <ma14:wrappingTextBoxFlag xmlns="" xmlns:ma14="http://schemas.microsoft.com/office/mac/drawingml/2011/main" val="1"/>
             </a:ext>
           </a:extLst>
         </p:spPr>
@@ -3561,11 +3623,7 @@
             </a:r>
             <a:r>
               <a:rPr lang="en-US" dirty="0" smtClean="0"/>
-              <a:t> </a:t>
-            </a:r>
-            <a:r>
-              <a:rPr lang="en-US" dirty="0" smtClean="0"/>
-              <a:t>JDK</a:t>
+              <a:t> JDK</a:t>
             </a:r>
           </a:p>
           <a:p>
@@ -3593,11 +3651,7 @@
           <a:p>
             <a:r>
               <a:rPr lang="en-US" dirty="0" smtClean="0"/>
-              <a:t>IntelliJ Ultimate </a:t>
-            </a:r>
-            <a:r>
-              <a:rPr lang="en-US" dirty="0" smtClean="0"/>
-              <a:t>Edition</a:t>
+              <a:t>IntelliJ Ultimate Edition</a:t>
             </a:r>
           </a:p>
           <a:p>
@@ -3938,7 +3992,12 @@
             <p:ph type="title"/>
           </p:nvPr>
         </p:nvSpPr>
-        <p:spPr/>
+        <p:spPr>
+          <a:xfrm>
+            <a:off x="952500" y="444500"/>
+            <a:ext cx="6188529" cy="2159000"/>
+          </a:xfrm>
+        </p:spPr>
         <p:txBody>
           <a:bodyPr/>
           <a:lstStyle/>
@@ -4053,6 +4112,47 @@
           </a:p>
         </p:txBody>
       </p:sp>
+      <p:pic>
+        <p:nvPicPr>
+          <p:cNvPr id="1026" name="Picture 2" descr="Image result for shall not pass exam"/>
+          <p:cNvPicPr>
+            <a:picLocks noChangeAspect="1" noChangeArrowheads="1"/>
+          </p:cNvPicPr>
+          <p:nvPr/>
+        </p:nvPicPr>
+        <p:blipFill>
+          <a:blip r:embed="rId2">
+            <a:extLst>
+              <a:ext uri="{28A0092B-C50C-407E-A947-70E740481C1C}">
+                <a14:useLocalDpi xmlns:a14="http://schemas.microsoft.com/office/drawing/2010/main" val="0"/>
+              </a:ext>
+            </a:extLst>
+          </a:blip>
+          <a:srcRect/>
+          <a:stretch>
+            <a:fillRect/>
+          </a:stretch>
+        </p:blipFill>
+        <p:spPr bwMode="auto">
+          <a:xfrm>
+            <a:off x="8640082" y="357288"/>
+            <a:ext cx="4161518" cy="2333423"/>
+          </a:xfrm>
+          <a:prstGeom prst="rect">
+            <a:avLst/>
+          </a:prstGeom>
+          <a:noFill/>
+          <a:extLst>
+            <a:ext uri="{909E8E84-426E-40DD-AFC4-6F175D3DCCD1}">
+              <a14:hiddenFill xmlns:a14="http://schemas.microsoft.com/office/drawing/2010/main">
+                <a:solidFill>
+                  <a:srgbClr val="FFFFFF"/>
+                </a:solidFill>
+              </a14:hiddenFill>
+            </a:ext>
+          </a:extLst>
+        </p:spPr>
+      </p:pic>
     </p:spTree>
     <p:extLst>
       <p:ext uri="{BB962C8B-B14F-4D97-AF65-F5344CB8AC3E}">
@@ -4317,20 +4417,32 @@
         </p:nvSpPr>
         <p:spPr>
           <a:xfrm>
-            <a:off x="669303" y="4996206"/>
-            <a:ext cx="11382996" cy="2922833"/>
+            <a:off x="511628" y="4996205"/>
+            <a:ext cx="12137571" cy="4474365"/>
           </a:xfrm>
         </p:spPr>
         <p:txBody>
-          <a:bodyPr/>
+          <a:bodyPr>
+            <a:normAutofit/>
+          </a:bodyPr>
           <a:lstStyle/>
           <a:p>
+            <a:pPr>
+              <a:spcBef>
+                <a:spcPts val="2400"/>
+              </a:spcBef>
+            </a:pPr>
             <a:r>
               <a:rPr lang="en-US" dirty="0" smtClean="0"/>
               <a:t>Easy, direct access to all elements</a:t>
             </a:r>
           </a:p>
           <a:p>
+            <a:pPr>
+              <a:spcBef>
+                <a:spcPts val="2400"/>
+              </a:spcBef>
+            </a:pPr>
             <a:r>
               <a:rPr lang="en-US" dirty="0" smtClean="0"/>
               <a:t>Possible issues when deleting elements (</a:t>
@@ -4345,9 +4457,40 @@
             </a:r>
           </a:p>
           <a:p>
-            <a:r>
-              <a:rPr lang="en-US" dirty="0" smtClean="0"/>
-              <a:t>Fixed size, decided at creation</a:t>
+            <a:pPr>
+              <a:spcBef>
+                <a:spcPts val="2400"/>
+              </a:spcBef>
+            </a:pPr>
+            <a:r>
+              <a:rPr lang="en-US" dirty="0" smtClean="0"/>
+              <a:t>Fixed size, decided at </a:t>
+            </a:r>
+            <a:r>
+              <a:rPr lang="en-US" dirty="0" smtClean="0"/>
+              <a:t>creation</a:t>
+            </a:r>
+          </a:p>
+          <a:p>
+            <a:pPr lvl="1">
+              <a:spcBef>
+                <a:spcPts val="2400"/>
+              </a:spcBef>
+            </a:pPr>
+            <a:r>
+              <a:rPr lang="en-US" dirty="0" smtClean="0"/>
+              <a:t>If you create it for 10 elements, but then you need 11, you would need to create a new array</a:t>
+            </a:r>
+          </a:p>
+          <a:p>
+            <a:pPr>
+              <a:spcBef>
+                <a:spcPts val="2400"/>
+              </a:spcBef>
+            </a:pPr>
+            <a:r>
+              <a:rPr lang="en-US" dirty="0" smtClean="0"/>
+              <a:t>Arrays are low-level constructs of Java language</a:t>
             </a:r>
             <a:endParaRPr lang="en-US" dirty="0"/>
           </a:p>
@@ -4982,7 +5125,11 @@
             </a:r>
             <a:r>
               <a:rPr lang="en-US" i="1" dirty="0" smtClean="0"/>
-              <a:t>I might just ignore it</a:t>
+              <a:t>I might just ignore </a:t>
+            </a:r>
+            <a:r>
+              <a:rPr lang="en-US" i="1" dirty="0" smtClean="0"/>
+              <a:t>your message</a:t>
             </a:r>
             <a:r>
               <a:rPr lang="mr-IN" i="1" dirty="0" smtClean="0"/>
@@ -5031,6 +5178,143 @@
         <p:spPr>
           <a:xfrm>
             <a:off x="952500" y="444500"/>
+            <a:ext cx="11099800" cy="1286329"/>
+          </a:xfrm>
+        </p:spPr>
+        <p:txBody>
+          <a:bodyPr>
+            <a:normAutofit fontScale="90000"/>
+          </a:bodyPr>
+          <a:lstStyle/>
+          <a:p>
+            <a:r>
+              <a:rPr lang="en-US" dirty="0" smtClean="0"/>
+              <a:t>Lists</a:t>
+            </a:r>
+            <a:endParaRPr lang="en-US" dirty="0"/>
+          </a:p>
+        </p:txBody>
+      </p:sp>
+      <p:sp>
+        <p:nvSpPr>
+          <p:cNvPr id="3" name="Text Placeholder 2"/>
+          <p:cNvSpPr>
+            <a:spLocks noGrp="1"/>
+          </p:cNvSpPr>
+          <p:nvPr>
+            <p:ph type="body" idx="1"/>
+          </p:nvPr>
+        </p:nvSpPr>
+        <p:spPr>
+          <a:xfrm>
+            <a:off x="446314" y="2188029"/>
+            <a:ext cx="12344400" cy="7424057"/>
+          </a:xfrm>
+        </p:spPr>
+        <p:txBody>
+          <a:bodyPr>
+            <a:normAutofit fontScale="92500"/>
+          </a:bodyPr>
+          <a:lstStyle/>
+          <a:p>
+            <a:r>
+              <a:rPr lang="en-US" dirty="0" smtClean="0"/>
+              <a:t>Conceptually like arrays, but no fixed size</a:t>
+            </a:r>
+          </a:p>
+          <a:p>
+            <a:pPr lvl="1"/>
+            <a:r>
+              <a:rPr lang="en-US" dirty="0" err="1"/>
+              <a:t>i</a:t>
+            </a:r>
+            <a:r>
+              <a:rPr lang="en-US" dirty="0" err="1" smtClean="0"/>
+              <a:t>e</a:t>
+            </a:r>
+            <a:r>
+              <a:rPr lang="en-US" dirty="0" smtClean="0"/>
+              <a:t>, you can add as many elements as you want, as long as you have enough memory</a:t>
+            </a:r>
+          </a:p>
+          <a:p>
+            <a:r>
+              <a:rPr lang="en-US" dirty="0" smtClean="0"/>
+              <a:t>Lists (and all data structures will see in this course) are Java objects, and not treated specially like arrays</a:t>
+            </a:r>
+          </a:p>
+          <a:p>
+            <a:r>
+              <a:rPr lang="en-US" dirty="0" smtClean="0"/>
+              <a:t>2 main ways to “implement” them</a:t>
+            </a:r>
+          </a:p>
+          <a:p>
+            <a:r>
+              <a:rPr lang="en-US" i="1" dirty="0" smtClean="0"/>
+              <a:t>Array-backed</a:t>
+            </a:r>
+            <a:r>
+              <a:rPr lang="en-US" dirty="0" smtClean="0"/>
+              <a:t>: internally storing an array. Need to create new one and move over old data when full.</a:t>
+            </a:r>
+          </a:p>
+          <a:p>
+            <a:r>
+              <a:rPr lang="en-US" i="1" dirty="0" smtClean="0"/>
+              <a:t>Linked-nodes</a:t>
+            </a:r>
+            <a:r>
+              <a:rPr lang="en-US" dirty="0" smtClean="0"/>
+              <a:t>: each element has its own node object, and nodes are connected with object pointers/links (see next slide)</a:t>
+            </a:r>
+          </a:p>
+        </p:txBody>
+      </p:sp>
+    </p:spTree>
+    <p:extLst>
+      <p:ext uri="{BB962C8B-B14F-4D97-AF65-F5344CB8AC3E}">
+        <p14:creationId xmlns:p14="http://schemas.microsoft.com/office/powerpoint/2010/main" val="316091039"/>
+      </p:ext>
+    </p:extLst>
+  </p:cSld>
+  <p:clrMapOvr>
+    <a:masterClrMapping/>
+  </p:clrMapOvr>
+  <p:transition spd="med"/>
+</p:sld>
+</file>
+
+<file path=ppt/slides/slide21.xml><?xml version="1.0" encoding="utf-8"?>
+<p:sld xmlns:a="http://schemas.openxmlformats.org/drawingml/2006/main" xmlns:r="http://schemas.openxmlformats.org/officeDocument/2006/relationships" xmlns:p="http://schemas.openxmlformats.org/presentationml/2006/main">
+  <p:cSld>
+    <p:spTree>
+      <p:nvGrpSpPr>
+        <p:cNvPr id="1" name=""/>
+        <p:cNvGrpSpPr/>
+        <p:nvPr/>
+      </p:nvGrpSpPr>
+      <p:grpSpPr>
+        <a:xfrm>
+          <a:off x="0" y="0"/>
+          <a:ext cx="0" cy="0"/>
+          <a:chOff x="0" y="0"/>
+          <a:chExt cx="0" cy="0"/>
+        </a:xfrm>
+      </p:grpSpPr>
+      <p:sp>
+        <p:nvSpPr>
+          <p:cNvPr id="2" name="Title 1"/>
+          <p:cNvSpPr>
+            <a:spLocks noGrp="1"/>
+          </p:cNvSpPr>
+          <p:nvPr>
+            <p:ph type="title"/>
+          </p:nvPr>
+        </p:nvSpPr>
+        <p:spPr>
+          <a:xfrm>
+            <a:off x="952500" y="444500"/>
             <a:ext cx="11099800" cy="903533"/>
           </a:xfrm>
         </p:spPr>
@@ -5042,7 +5326,7 @@
           <a:p>
             <a:r>
               <a:rPr lang="en-US" dirty="0" smtClean="0"/>
-              <a:t>Lists</a:t>
+              <a:t>Linked Lists</a:t>
             </a:r>
             <a:endParaRPr lang="en-US" dirty="0"/>
           </a:p>
@@ -5780,60 +6064,6 @@
 </p:sld>
 </file>
 
-<file path=ppt/slides/slide21.xml><?xml version="1.0" encoding="utf-8"?>
-<p:sld xmlns:a="http://schemas.openxmlformats.org/drawingml/2006/main" xmlns:r="http://schemas.openxmlformats.org/officeDocument/2006/relationships" xmlns:p="http://schemas.openxmlformats.org/presentationml/2006/main">
-  <p:cSld>
-    <p:spTree>
-      <p:nvGrpSpPr>
-        <p:cNvPr id="1" name=""/>
-        <p:cNvGrpSpPr/>
-        <p:nvPr/>
-      </p:nvGrpSpPr>
-      <p:grpSpPr>
-        <a:xfrm>
-          <a:off x="0" y="0"/>
-          <a:ext cx="0" cy="0"/>
-          <a:chOff x="0" y="0"/>
-          <a:chExt cx="0" cy="0"/>
-        </a:xfrm>
-      </p:grpSpPr>
-      <p:sp>
-        <p:nvSpPr>
-          <p:cNvPr id="2" name="Title 1"/>
-          <p:cNvSpPr>
-            <a:spLocks noGrp="1"/>
-          </p:cNvSpPr>
-          <p:nvPr>
-            <p:ph type="title"/>
-          </p:nvPr>
-        </p:nvSpPr>
-        <p:spPr/>
-        <p:txBody>
-          <a:bodyPr/>
-          <a:lstStyle/>
-          <a:p>
-            <a:r>
-              <a:rPr lang="en-US" dirty="0" smtClean="0"/>
-              <a:t>Unit Testing</a:t>
-            </a:r>
-            <a:endParaRPr lang="en-US" dirty="0"/>
-          </a:p>
-        </p:txBody>
-      </p:sp>
-    </p:spTree>
-    <p:extLst>
-      <p:ext uri="{BB962C8B-B14F-4D97-AF65-F5344CB8AC3E}">
-        <p14:creationId xmlns:p14="http://schemas.microsoft.com/office/powerpoint/2010/main" val="612520629"/>
-      </p:ext>
-    </p:extLst>
-  </p:cSld>
-  <p:clrMapOvr>
-    <a:masterClrMapping/>
-  </p:clrMapOvr>
-  <p:transition spd="med"/>
-</p:sld>
-</file>
-
 <file path=ppt/slides/slide22.xml><?xml version="1.0" encoding="utf-8"?>
 <p:sld xmlns:a="http://schemas.openxmlformats.org/drawingml/2006/main" xmlns:r="http://schemas.openxmlformats.org/officeDocument/2006/relationships" xmlns:p="http://schemas.openxmlformats.org/presentationml/2006/main">
   <p:cSld>
@@ -5868,6 +6098,60 @@
           <a:p>
             <a:r>
               <a:rPr lang="en-US" dirty="0" smtClean="0"/>
+              <a:t>Unit Testing</a:t>
+            </a:r>
+            <a:endParaRPr lang="en-US" dirty="0"/>
+          </a:p>
+        </p:txBody>
+      </p:sp>
+    </p:spTree>
+    <p:extLst>
+      <p:ext uri="{BB962C8B-B14F-4D97-AF65-F5344CB8AC3E}">
+        <p14:creationId xmlns:p14="http://schemas.microsoft.com/office/powerpoint/2010/main" val="612520629"/>
+      </p:ext>
+    </p:extLst>
+  </p:cSld>
+  <p:clrMapOvr>
+    <a:masterClrMapping/>
+  </p:clrMapOvr>
+  <p:transition spd="med"/>
+</p:sld>
+</file>
+
+<file path=ppt/slides/slide23.xml><?xml version="1.0" encoding="utf-8"?>
+<p:sld xmlns:a="http://schemas.openxmlformats.org/drawingml/2006/main" xmlns:r="http://schemas.openxmlformats.org/officeDocument/2006/relationships" xmlns:p="http://schemas.openxmlformats.org/presentationml/2006/main">
+  <p:cSld>
+    <p:spTree>
+      <p:nvGrpSpPr>
+        <p:cNvPr id="1" name=""/>
+        <p:cNvGrpSpPr/>
+        <p:nvPr/>
+      </p:nvGrpSpPr>
+      <p:grpSpPr>
+        <a:xfrm>
+          <a:off x="0" y="0"/>
+          <a:ext cx="0" cy="0"/>
+          <a:chOff x="0" y="0"/>
+          <a:chExt cx="0" cy="0"/>
+        </a:xfrm>
+      </p:grpSpPr>
+      <p:sp>
+        <p:nvSpPr>
+          <p:cNvPr id="2" name="Title 1"/>
+          <p:cNvSpPr>
+            <a:spLocks noGrp="1"/>
+          </p:cNvSpPr>
+          <p:nvPr>
+            <p:ph type="title"/>
+          </p:nvPr>
+        </p:nvSpPr>
+        <p:spPr/>
+        <p:txBody>
+          <a:bodyPr/>
+          <a:lstStyle/>
+          <a:p>
+            <a:r>
+              <a:rPr lang="en-US" dirty="0" smtClean="0"/>
               <a:t>Bugs</a:t>
             </a:r>
             <a:endParaRPr lang="en-US" dirty="0"/>
@@ -5943,7 +6227,7 @@
 </p:sld>
 </file>
 
-<file path=ppt/slides/slide23.xml><?xml version="1.0" encoding="utf-8"?>
+<file path=ppt/slides/slide24.xml><?xml version="1.0" encoding="utf-8"?>
 <p:sld xmlns:a="http://schemas.openxmlformats.org/drawingml/2006/main" xmlns:r="http://schemas.openxmlformats.org/officeDocument/2006/relationships" xmlns:p="http://schemas.openxmlformats.org/presentationml/2006/main">
   <p:cSld>
     <p:spTree>
@@ -6663,177 +6947,6 @@
 </p:sld>
 </file>
 
-<file path=ppt/slides/slide24.xml><?xml version="1.0" encoding="utf-8"?>
-<p:sld xmlns:a="http://schemas.openxmlformats.org/drawingml/2006/main" xmlns:r="http://schemas.openxmlformats.org/officeDocument/2006/relationships" xmlns:p="http://schemas.openxmlformats.org/presentationml/2006/main">
-  <p:cSld>
-    <p:spTree>
-      <p:nvGrpSpPr>
-        <p:cNvPr id="1" name=""/>
-        <p:cNvGrpSpPr/>
-        <p:nvPr/>
-      </p:nvGrpSpPr>
-      <p:grpSpPr>
-        <a:xfrm>
-          <a:off x="0" y="0"/>
-          <a:ext cx="0" cy="0"/>
-          <a:chOff x="0" y="0"/>
-          <a:chExt cx="0" cy="0"/>
-        </a:xfrm>
-      </p:grpSpPr>
-      <p:sp>
-        <p:nvSpPr>
-          <p:cNvPr id="2" name="Title 1"/>
-          <p:cNvSpPr>
-            <a:spLocks noGrp="1"/>
-          </p:cNvSpPr>
-          <p:nvPr>
-            <p:ph type="title"/>
-          </p:nvPr>
-        </p:nvSpPr>
-        <p:spPr/>
-        <p:txBody>
-          <a:bodyPr/>
-          <a:lstStyle/>
-          <a:p>
-            <a:r>
-              <a:rPr lang="en-US" dirty="0" smtClean="0"/>
-              <a:t>Writing Unit Tests</a:t>
-            </a:r>
-            <a:endParaRPr lang="en-US" dirty="0"/>
-          </a:p>
-        </p:txBody>
-      </p:sp>
-      <p:sp>
-        <p:nvSpPr>
-          <p:cNvPr id="3" name="Text Placeholder 2"/>
-          <p:cNvSpPr>
-            <a:spLocks noGrp="1"/>
-          </p:cNvSpPr>
-          <p:nvPr>
-            <p:ph type="body" idx="1"/>
-          </p:nvPr>
-        </p:nvSpPr>
-        <p:spPr>
-          <a:xfrm>
-            <a:off x="405353" y="2603499"/>
-            <a:ext cx="12330259" cy="6945854"/>
-          </a:xfrm>
-        </p:spPr>
-        <p:txBody>
-          <a:bodyPr>
-            <a:normAutofit lnSpcReduction="10000"/>
-          </a:bodyPr>
-          <a:lstStyle/>
-          <a:p>
-            <a:r>
-              <a:rPr lang="en-US" dirty="0" smtClean="0"/>
-              <a:t>Using a library called </a:t>
-            </a:r>
-            <a:r>
-              <a:rPr lang="en-US" b="1" dirty="0" smtClean="0"/>
-              <a:t>JUnit</a:t>
-            </a:r>
-          </a:p>
-          <a:p>
-            <a:pPr lvl="1"/>
-            <a:r>
-              <a:rPr lang="en-US" dirty="0" smtClean="0"/>
-              <a:t>Note: how to configure Maven to import third-party libraries is not part of this course (and so not on the exam), but you can ask me in the breaks if you are curious (for some of you, we will dig into its low level details in Enterprise Programming 1 next semester)</a:t>
-            </a:r>
-          </a:p>
-          <a:p>
-            <a:r>
-              <a:rPr lang="en-US" dirty="0" smtClean="0"/>
-              <a:t>Regular code in “</a:t>
-            </a:r>
-            <a:r>
-              <a:rPr lang="en-US" i="1" dirty="0" err="1" smtClean="0"/>
-              <a:t>src</a:t>
-            </a:r>
-            <a:r>
-              <a:rPr lang="en-US" i="1" dirty="0" smtClean="0"/>
-              <a:t>/main/java</a:t>
-            </a:r>
-            <a:r>
-              <a:rPr lang="en-US" dirty="0" smtClean="0"/>
-              <a:t>” folder</a:t>
-            </a:r>
-          </a:p>
-          <a:p>
-            <a:r>
-              <a:rPr lang="en-US" dirty="0" smtClean="0"/>
-              <a:t>Test </a:t>
-            </a:r>
-            <a:r>
-              <a:rPr lang="en-US" dirty="0"/>
-              <a:t>code in “</a:t>
-            </a:r>
-            <a:r>
-              <a:rPr lang="en-US" i="1" dirty="0" err="1" smtClean="0"/>
-              <a:t>src</a:t>
-            </a:r>
-            <a:r>
-              <a:rPr lang="en-US" i="1" dirty="0" smtClean="0"/>
-              <a:t>/test/java</a:t>
-            </a:r>
-            <a:r>
-              <a:rPr lang="en-US" dirty="0"/>
-              <a:t>” </a:t>
-            </a:r>
-            <a:r>
-              <a:rPr lang="en-US" dirty="0" smtClean="0"/>
-              <a:t>folder</a:t>
-            </a:r>
-          </a:p>
-          <a:p>
-            <a:r>
-              <a:rPr lang="en-US" dirty="0" smtClean="0"/>
-              <a:t>A test class is just a Java class with </a:t>
-            </a:r>
-            <a:r>
-              <a:rPr lang="en-US" i="1" dirty="0" smtClean="0"/>
-              <a:t>@ annotations</a:t>
-            </a:r>
-          </a:p>
-          <a:p>
-            <a:r>
-              <a:rPr lang="en-US" dirty="0" smtClean="0"/>
-              <a:t>A test class for a class called </a:t>
-            </a:r>
-            <a:r>
-              <a:rPr lang="en-US" i="1" dirty="0" smtClean="0"/>
-              <a:t>Foo.java</a:t>
-            </a:r>
-            <a:r>
-              <a:rPr lang="en-US" dirty="0" smtClean="0"/>
-              <a:t> will be called </a:t>
-            </a:r>
-            <a:r>
-              <a:rPr lang="en-US" i="1" dirty="0" smtClean="0"/>
-              <a:t>FooTest.java</a:t>
-            </a:r>
-            <a:r>
-              <a:rPr lang="en-US" dirty="0" smtClean="0"/>
-              <a:t>, in the same package</a:t>
-            </a:r>
-            <a:endParaRPr lang="en-US" i="1" dirty="0"/>
-          </a:p>
-        </p:txBody>
-      </p:sp>
-    </p:spTree>
-    <p:extLst>
-      <p:ext uri="{BB962C8B-B14F-4D97-AF65-F5344CB8AC3E}">
-        <p14:creationId xmlns:p14="http://schemas.microsoft.com/office/powerpoint/2010/main" val="3303595683"/>
-      </p:ext>
-    </p:extLst>
-  </p:cSld>
-  <p:clrMapOvr>
-    <a:masterClrMapping/>
-  </p:clrMapOvr>
-  <p:transition spd="med"/>
-</p:sld>
-</file>
-
 <file path=ppt/slides/slide25.xml><?xml version="1.0" encoding="utf-8"?>
 <p:sld xmlns:a="http://schemas.openxmlformats.org/drawingml/2006/main" xmlns:r="http://schemas.openxmlformats.org/officeDocument/2006/relationships" xmlns:p="http://schemas.openxmlformats.org/presentationml/2006/main">
   <p:cSld>
@@ -6868,7 +6981,7 @@
           <a:p>
             <a:r>
               <a:rPr lang="en-US" dirty="0" smtClean="0"/>
-              <a:t>Main @ Annotations</a:t>
+              <a:t>Writing Unit Tests</a:t>
             </a:r>
             <a:endParaRPr lang="en-US" dirty="0"/>
           </a:p>
@@ -6884,91 +6997,117 @@
             <p:ph type="body" idx="1"/>
           </p:nvPr>
         </p:nvSpPr>
-        <p:spPr/>
+        <p:spPr>
+          <a:xfrm>
+            <a:off x="405353" y="2603499"/>
+            <a:ext cx="12330259" cy="6945854"/>
+          </a:xfrm>
+        </p:spPr>
         <p:txBody>
-          <a:bodyPr/>
+          <a:bodyPr>
+            <a:normAutofit lnSpcReduction="10000"/>
+          </a:bodyPr>
           <a:lstStyle/>
           <a:p>
             <a:r>
+              <a:rPr lang="en-US" dirty="0" smtClean="0"/>
+              <a:t>Using a library called </a:t>
+            </a:r>
+            <a:r>
               <a:rPr lang="en-US" b="1" dirty="0" smtClean="0"/>
-              <a:t>@Test</a:t>
-            </a:r>
-            <a:r>
-              <a:rPr lang="en-US" dirty="0" smtClean="0"/>
-              <a:t>: mark a method as a test</a:t>
-            </a:r>
-          </a:p>
-          <a:p>
-            <a:r>
-              <a:rPr lang="en-US" b="1" dirty="0"/>
-              <a:t>@</a:t>
-            </a:r>
-            <a:r>
-              <a:rPr lang="en-US" b="1" dirty="0" err="1" smtClean="0"/>
-              <a:t>BeforeEach</a:t>
-            </a:r>
-            <a:r>
-              <a:rPr lang="en-US" dirty="0" smtClean="0"/>
-              <a:t>: execute method before each test</a:t>
-            </a:r>
-          </a:p>
-          <a:p>
-            <a:r>
-              <a:rPr lang="en-US" b="1" dirty="0" smtClean="0"/>
-              <a:t>@</a:t>
-            </a:r>
-            <a:r>
-              <a:rPr lang="en-US" b="1" dirty="0" err="1" smtClean="0"/>
-              <a:t>BeforeAll</a:t>
-            </a:r>
-            <a:r>
-              <a:rPr lang="en-US" dirty="0" smtClean="0"/>
-              <a:t>: execute method once before any of the tests is started</a:t>
-            </a:r>
-          </a:p>
-          <a:p>
-            <a:r>
-              <a:rPr lang="en-US" b="1" dirty="0" smtClean="0"/>
-              <a:t>@</a:t>
-            </a:r>
-            <a:r>
-              <a:rPr lang="en-US" b="1" dirty="0" err="1" smtClean="0"/>
-              <a:t>AfterEach</a:t>
-            </a:r>
-            <a:r>
-              <a:rPr lang="en-US" dirty="0" smtClean="0"/>
-              <a:t>, </a:t>
-            </a:r>
-            <a:r>
-              <a:rPr lang="en-US" b="1" dirty="0" smtClean="0"/>
-              <a:t>@</a:t>
-            </a:r>
-            <a:r>
-              <a:rPr lang="en-US" b="1" dirty="0" err="1" smtClean="0"/>
-              <a:t>AfterAll</a:t>
-            </a:r>
-            <a:r>
-              <a:rPr lang="en-US" dirty="0" smtClean="0"/>
-              <a:t>: same, but after the tests </a:t>
-            </a:r>
-          </a:p>
-          <a:p>
-            <a:r>
-              <a:rPr lang="en-US" b="1" dirty="0" smtClean="0"/>
-              <a:t>@Disable</a:t>
-            </a:r>
-            <a:r>
-              <a:rPr lang="en-US" dirty="0" smtClean="0"/>
-              <a:t>: temporarily disable a test, which is not going to be run</a:t>
-            </a:r>
-            <a:endParaRPr lang="en-US" dirty="0"/>
+              <a:t>JUnit</a:t>
+            </a:r>
+          </a:p>
+          <a:p>
+            <a:pPr lvl="1"/>
+            <a:r>
+              <a:rPr lang="en-US" dirty="0" smtClean="0"/>
+              <a:t>Note: how to configure Maven to import third-party libraries is not part of this course (and so not on the exam), but you can ask me in the breaks if you are curious (for some of you, we will dig into its low level details in Enterprise Programming 1 next semester)</a:t>
+            </a:r>
+          </a:p>
+          <a:p>
+            <a:r>
+              <a:rPr lang="en-US" dirty="0" smtClean="0"/>
+              <a:t>Regular code in “</a:t>
+            </a:r>
+            <a:r>
+              <a:rPr lang="en-US" i="1" dirty="0" err="1" smtClean="0"/>
+              <a:t>src</a:t>
+            </a:r>
+            <a:r>
+              <a:rPr lang="en-US" i="1" dirty="0" smtClean="0"/>
+              <a:t>/main/java</a:t>
+            </a:r>
+            <a:r>
+              <a:rPr lang="en-US" dirty="0" smtClean="0"/>
+              <a:t>” folder</a:t>
+            </a:r>
+          </a:p>
+          <a:p>
+            <a:r>
+              <a:rPr lang="en-US" dirty="0" smtClean="0"/>
+              <a:t>Test </a:t>
+            </a:r>
+            <a:r>
+              <a:rPr lang="en-US" dirty="0"/>
+              <a:t>code in “</a:t>
+            </a:r>
+            <a:r>
+              <a:rPr lang="en-US" i="1" dirty="0" err="1" smtClean="0"/>
+              <a:t>src</a:t>
+            </a:r>
+            <a:r>
+              <a:rPr lang="en-US" i="1" dirty="0" smtClean="0"/>
+              <a:t>/test/java</a:t>
+            </a:r>
+            <a:r>
+              <a:rPr lang="en-US" dirty="0"/>
+              <a:t>” </a:t>
+            </a:r>
+            <a:r>
+              <a:rPr lang="en-US" dirty="0" smtClean="0"/>
+              <a:t>folder</a:t>
+            </a:r>
+          </a:p>
+          <a:p>
+            <a:r>
+              <a:rPr lang="en-US" dirty="0" smtClean="0"/>
+              <a:t>A test class is just a Java class with </a:t>
+            </a:r>
+            <a:r>
+              <a:rPr lang="en-US" i="1" dirty="0" smtClean="0"/>
+              <a:t>@ annotations</a:t>
+            </a:r>
+          </a:p>
+          <a:p>
+            <a:r>
+              <a:rPr lang="en-US" dirty="0" smtClean="0"/>
+              <a:t>A test class for a class called </a:t>
+            </a:r>
+            <a:r>
+              <a:rPr lang="en-US" i="1" dirty="0" smtClean="0"/>
+              <a:t>Foo.java</a:t>
+            </a:r>
+            <a:r>
+              <a:rPr lang="en-US" dirty="0" smtClean="0"/>
+              <a:t> will be called </a:t>
+            </a:r>
+            <a:r>
+              <a:rPr lang="en-US" i="1" dirty="0" smtClean="0"/>
+              <a:t>FooTest.java</a:t>
+            </a:r>
+            <a:r>
+              <a:rPr lang="en-US" dirty="0" smtClean="0"/>
+              <a:t>, in the same package</a:t>
+            </a:r>
+            <a:endParaRPr lang="en-US" i="1" dirty="0"/>
           </a:p>
         </p:txBody>
       </p:sp>
     </p:spTree>
     <p:extLst>
       <p:ext uri="{BB962C8B-B14F-4D97-AF65-F5344CB8AC3E}">
-        <p14:creationId xmlns:p14="http://schemas.microsoft.com/office/powerpoint/2010/main" val="2593368313"/>
+        <p14:creationId xmlns:p14="http://schemas.microsoft.com/office/powerpoint/2010/main" val="3303595683"/>
       </p:ext>
     </p:extLst>
   </p:cSld>
@@ -7013,6 +7152,151 @@
           <a:p>
             <a:r>
               <a:rPr lang="en-US" dirty="0" smtClean="0"/>
+              <a:t>Main @ Annotations</a:t>
+            </a:r>
+            <a:endParaRPr lang="en-US" dirty="0"/>
+          </a:p>
+        </p:txBody>
+      </p:sp>
+      <p:sp>
+        <p:nvSpPr>
+          <p:cNvPr id="3" name="Text Placeholder 2"/>
+          <p:cNvSpPr>
+            <a:spLocks noGrp="1"/>
+          </p:cNvSpPr>
+          <p:nvPr>
+            <p:ph type="body" idx="1"/>
+          </p:nvPr>
+        </p:nvSpPr>
+        <p:spPr/>
+        <p:txBody>
+          <a:bodyPr/>
+          <a:lstStyle/>
+          <a:p>
+            <a:r>
+              <a:rPr lang="en-US" b="1" dirty="0" smtClean="0"/>
+              <a:t>@Test</a:t>
+            </a:r>
+            <a:r>
+              <a:rPr lang="en-US" dirty="0" smtClean="0"/>
+              <a:t>: mark a method as a test</a:t>
+            </a:r>
+          </a:p>
+          <a:p>
+            <a:r>
+              <a:rPr lang="en-US" b="1" dirty="0"/>
+              <a:t>@</a:t>
+            </a:r>
+            <a:r>
+              <a:rPr lang="en-US" b="1" dirty="0" err="1" smtClean="0"/>
+              <a:t>BeforeEach</a:t>
+            </a:r>
+            <a:r>
+              <a:rPr lang="en-US" dirty="0" smtClean="0"/>
+              <a:t>: execute method before each test</a:t>
+            </a:r>
+          </a:p>
+          <a:p>
+            <a:r>
+              <a:rPr lang="en-US" b="1" dirty="0" smtClean="0"/>
+              <a:t>@</a:t>
+            </a:r>
+            <a:r>
+              <a:rPr lang="en-US" b="1" dirty="0" err="1" smtClean="0"/>
+              <a:t>BeforeAll</a:t>
+            </a:r>
+            <a:r>
+              <a:rPr lang="en-US" dirty="0" smtClean="0"/>
+              <a:t>: execute method once before any of the tests is started</a:t>
+            </a:r>
+          </a:p>
+          <a:p>
+            <a:r>
+              <a:rPr lang="en-US" b="1" dirty="0" smtClean="0"/>
+              <a:t>@</a:t>
+            </a:r>
+            <a:r>
+              <a:rPr lang="en-US" b="1" dirty="0" err="1" smtClean="0"/>
+              <a:t>AfterEach</a:t>
+            </a:r>
+            <a:r>
+              <a:rPr lang="en-US" dirty="0" smtClean="0"/>
+              <a:t>, </a:t>
+            </a:r>
+            <a:r>
+              <a:rPr lang="en-US" b="1" dirty="0" smtClean="0"/>
+              <a:t>@</a:t>
+            </a:r>
+            <a:r>
+              <a:rPr lang="en-US" b="1" dirty="0" err="1" smtClean="0"/>
+              <a:t>AfterAll</a:t>
+            </a:r>
+            <a:r>
+              <a:rPr lang="en-US" dirty="0" smtClean="0"/>
+              <a:t>: same, but after the tests </a:t>
+            </a:r>
+          </a:p>
+          <a:p>
+            <a:r>
+              <a:rPr lang="en-US" b="1" dirty="0" smtClean="0"/>
+              <a:t>@Disable</a:t>
+            </a:r>
+            <a:r>
+              <a:rPr lang="en-US" dirty="0" smtClean="0"/>
+              <a:t>: temporarily disable a test, which is not going to be run</a:t>
+            </a:r>
+            <a:endParaRPr lang="en-US" dirty="0"/>
+          </a:p>
+        </p:txBody>
+      </p:sp>
+    </p:spTree>
+    <p:extLst>
+      <p:ext uri="{BB962C8B-B14F-4D97-AF65-F5344CB8AC3E}">
+        <p14:creationId xmlns:p14="http://schemas.microsoft.com/office/powerpoint/2010/main" val="2593368313"/>
+      </p:ext>
+    </p:extLst>
+  </p:cSld>
+  <p:clrMapOvr>
+    <a:masterClrMapping/>
+  </p:clrMapOvr>
+  <p:transition spd="med"/>
+</p:sld>
+</file>
+
+<file path=ppt/slides/slide27.xml><?xml version="1.0" encoding="utf-8"?>
+<p:sld xmlns:a="http://schemas.openxmlformats.org/drawingml/2006/main" xmlns:r="http://schemas.openxmlformats.org/officeDocument/2006/relationships" xmlns:p="http://schemas.openxmlformats.org/presentationml/2006/main">
+  <p:cSld>
+    <p:spTree>
+      <p:nvGrpSpPr>
+        <p:cNvPr id="1" name=""/>
+        <p:cNvGrpSpPr/>
+        <p:nvPr/>
+      </p:nvGrpSpPr>
+      <p:grpSpPr>
+        <a:xfrm>
+          <a:off x="0" y="0"/>
+          <a:ext cx="0" cy="0"/>
+          <a:chOff x="0" y="0"/>
+          <a:chExt cx="0" cy="0"/>
+        </a:xfrm>
+      </p:grpSpPr>
+      <p:sp>
+        <p:nvSpPr>
+          <p:cNvPr id="2" name="Title 1"/>
+          <p:cNvSpPr>
+            <a:spLocks noGrp="1"/>
+          </p:cNvSpPr>
+          <p:nvPr>
+            <p:ph type="title"/>
+          </p:nvPr>
+        </p:nvSpPr>
+        <p:spPr/>
+        <p:txBody>
+          <a:bodyPr/>
+          <a:lstStyle/>
+          <a:p>
+            <a:r>
+              <a:rPr lang="en-US" dirty="0" smtClean="0"/>
               <a:t>Assertions</a:t>
             </a:r>
             <a:endParaRPr lang="en-US" dirty="0"/>
@@ -7201,7 +7485,7 @@
 </p:sld>
 </file>
 
-<file path=ppt/slides/slide27.xml><?xml version="1.0" encoding="utf-8"?>
+<file path=ppt/slides/slide28.xml><?xml version="1.0" encoding="utf-8"?>
 <p:sld xmlns:a="http://schemas.openxmlformats.org/drawingml/2006/main" xmlns:r="http://schemas.openxmlformats.org/officeDocument/2006/relationships" xmlns:p="http://schemas.openxmlformats.org/presentationml/2006/main">
   <p:cSld>
     <p:spTree>
@@ -8583,7 +8867,7 @@
 </p:sld>
 </file>
 
-<file path=ppt/slides/slide28.xml><?xml version="1.0" encoding="utf-8"?>
+<file path=ppt/slides/slide29.xml><?xml version="1.0" encoding="utf-8"?>
 <p:sld xmlns:a="http://schemas.openxmlformats.org/drawingml/2006/main" xmlns:r="http://schemas.openxmlformats.org/officeDocument/2006/relationships" xmlns:p="http://schemas.openxmlformats.org/presentationml/2006/main">
   <p:cSld>
     <p:spTree>
@@ -8734,144 +9018,6 @@
     <p:extLst>
       <p:ext uri="{BB962C8B-B14F-4D97-AF65-F5344CB8AC3E}">
         <p14:creationId xmlns:p14="http://schemas.microsoft.com/office/powerpoint/2010/main" val="3232246092"/>
-      </p:ext>
-    </p:extLst>
-  </p:cSld>
-  <p:clrMapOvr>
-    <a:masterClrMapping/>
-  </p:clrMapOvr>
-  <p:transition spd="med"/>
-</p:sld>
-</file>
-
-<file path=ppt/slides/slide29.xml><?xml version="1.0" encoding="utf-8"?>
-<p:sld xmlns:a="http://schemas.openxmlformats.org/drawingml/2006/main" xmlns:r="http://schemas.openxmlformats.org/officeDocument/2006/relationships" xmlns:p="http://schemas.openxmlformats.org/presentationml/2006/main">
-  <p:cSld>
-    <p:spTree>
-      <p:nvGrpSpPr>
-        <p:cNvPr id="1" name=""/>
-        <p:cNvGrpSpPr/>
-        <p:nvPr/>
-      </p:nvGrpSpPr>
-      <p:grpSpPr>
-        <a:xfrm>
-          <a:off x="0" y="0"/>
-          <a:ext cx="0" cy="0"/>
-          <a:chOff x="0" y="0"/>
-          <a:chExt cx="0" cy="0"/>
-        </a:xfrm>
-      </p:grpSpPr>
-      <p:sp>
-        <p:nvSpPr>
-          <p:cNvPr id="2" name="Title 1"/>
-          <p:cNvSpPr>
-            <a:spLocks noGrp="1"/>
-          </p:cNvSpPr>
-          <p:nvPr>
-            <p:ph type="title"/>
-          </p:nvPr>
-        </p:nvSpPr>
-        <p:spPr/>
-        <p:txBody>
-          <a:bodyPr/>
-          <a:lstStyle/>
-          <a:p>
-            <a:r>
-              <a:rPr lang="en-US" dirty="0" smtClean="0"/>
-              <a:t>Debugging</a:t>
-            </a:r>
-            <a:endParaRPr lang="en-US" dirty="0"/>
-          </a:p>
-        </p:txBody>
-      </p:sp>
-      <p:sp>
-        <p:nvSpPr>
-          <p:cNvPr id="3" name="Text Placeholder 2"/>
-          <p:cNvSpPr>
-            <a:spLocks noGrp="1"/>
-          </p:cNvSpPr>
-          <p:nvPr>
-            <p:ph type="body" idx="1"/>
-          </p:nvPr>
-        </p:nvSpPr>
-        <p:spPr>
-          <a:xfrm>
-            <a:off x="7336052" y="2603500"/>
-            <a:ext cx="5437268" cy="6870438"/>
-          </a:xfrm>
-        </p:spPr>
-        <p:txBody>
-          <a:bodyPr/>
-          <a:lstStyle/>
-          <a:p>
-            <a:r>
-              <a:rPr lang="en-US" b="1" dirty="0" smtClean="0"/>
-              <a:t>VERY IMPORTANT</a:t>
-            </a:r>
-          </a:p>
-          <a:p>
-            <a:r>
-              <a:rPr lang="en-US" dirty="0" smtClean="0"/>
-              <a:t>Can put “</a:t>
-            </a:r>
-            <a:r>
-              <a:rPr lang="en-US" i="1" dirty="0" smtClean="0"/>
-              <a:t>break points</a:t>
-            </a:r>
-            <a:r>
-              <a:rPr lang="en-US" dirty="0" smtClean="0"/>
-              <a:t>”</a:t>
-            </a:r>
-          </a:p>
-          <a:p>
-            <a:r>
-              <a:rPr lang="en-US" dirty="0" smtClean="0"/>
-              <a:t>Execute one step at a time</a:t>
-            </a:r>
-          </a:p>
-          <a:p>
-            <a:r>
-              <a:rPr lang="en-US" dirty="0" smtClean="0"/>
-              <a:t>Inspect status of all variables, at each step</a:t>
-            </a:r>
-          </a:p>
-          <a:p>
-            <a:r>
-              <a:rPr lang="en-US" dirty="0" smtClean="0"/>
-              <a:t>Easier to understand with live demo</a:t>
-            </a:r>
-            <a:endParaRPr lang="en-US" dirty="0"/>
-          </a:p>
-        </p:txBody>
-      </p:sp>
-      <p:pic>
-        <p:nvPicPr>
-          <p:cNvPr id="4" name="Picture 3"/>
-          <p:cNvPicPr>
-            <a:picLocks noChangeAspect="1"/>
-          </p:cNvPicPr>
-          <p:nvPr/>
-        </p:nvPicPr>
-        <p:blipFill>
-          <a:blip r:embed="rId2"/>
-          <a:stretch>
-            <a:fillRect/>
-          </a:stretch>
-        </p:blipFill>
-        <p:spPr>
-          <a:xfrm>
-            <a:off x="472180" y="2603500"/>
-            <a:ext cx="6383552" cy="6959600"/>
-          </a:xfrm>
-          <a:prstGeom prst="rect">
-            <a:avLst/>
-          </a:prstGeom>
-        </p:spPr>
-      </p:pic>
-    </p:spTree>
-    <p:extLst>
-      <p:ext uri="{BB962C8B-B14F-4D97-AF65-F5344CB8AC3E}">
-        <p14:creationId xmlns:p14="http://schemas.microsoft.com/office/powerpoint/2010/main" val="2427230543"/>
       </p:ext>
     </p:extLst>
   </p:cSld>
@@ -9045,6 +9191,144 @@
           <a:p>
             <a:r>
               <a:rPr lang="en-US" dirty="0" smtClean="0"/>
+              <a:t>Debugging</a:t>
+            </a:r>
+            <a:endParaRPr lang="en-US" dirty="0"/>
+          </a:p>
+        </p:txBody>
+      </p:sp>
+      <p:sp>
+        <p:nvSpPr>
+          <p:cNvPr id="3" name="Text Placeholder 2"/>
+          <p:cNvSpPr>
+            <a:spLocks noGrp="1"/>
+          </p:cNvSpPr>
+          <p:nvPr>
+            <p:ph type="body" idx="1"/>
+          </p:nvPr>
+        </p:nvSpPr>
+        <p:spPr>
+          <a:xfrm>
+            <a:off x="7336052" y="2603500"/>
+            <a:ext cx="5437268" cy="6870438"/>
+          </a:xfrm>
+        </p:spPr>
+        <p:txBody>
+          <a:bodyPr/>
+          <a:lstStyle/>
+          <a:p>
+            <a:r>
+              <a:rPr lang="en-US" b="1" dirty="0" smtClean="0"/>
+              <a:t>VERY IMPORTANT</a:t>
+            </a:r>
+          </a:p>
+          <a:p>
+            <a:r>
+              <a:rPr lang="en-US" dirty="0" smtClean="0"/>
+              <a:t>Can put “</a:t>
+            </a:r>
+            <a:r>
+              <a:rPr lang="en-US" i="1" dirty="0" smtClean="0"/>
+              <a:t>break points</a:t>
+            </a:r>
+            <a:r>
+              <a:rPr lang="en-US" dirty="0" smtClean="0"/>
+              <a:t>”</a:t>
+            </a:r>
+          </a:p>
+          <a:p>
+            <a:r>
+              <a:rPr lang="en-US" dirty="0" smtClean="0"/>
+              <a:t>Execute one step at a time</a:t>
+            </a:r>
+          </a:p>
+          <a:p>
+            <a:r>
+              <a:rPr lang="en-US" dirty="0" smtClean="0"/>
+              <a:t>Inspect status of all variables, at each step</a:t>
+            </a:r>
+          </a:p>
+          <a:p>
+            <a:r>
+              <a:rPr lang="en-US" dirty="0" smtClean="0"/>
+              <a:t>Easier to understand with live demo</a:t>
+            </a:r>
+            <a:endParaRPr lang="en-US" dirty="0"/>
+          </a:p>
+        </p:txBody>
+      </p:sp>
+      <p:pic>
+        <p:nvPicPr>
+          <p:cNvPr id="4" name="Picture 3"/>
+          <p:cNvPicPr>
+            <a:picLocks noChangeAspect="1"/>
+          </p:cNvPicPr>
+          <p:nvPr/>
+        </p:nvPicPr>
+        <p:blipFill>
+          <a:blip r:embed="rId2"/>
+          <a:stretch>
+            <a:fillRect/>
+          </a:stretch>
+        </p:blipFill>
+        <p:spPr>
+          <a:xfrm>
+            <a:off x="472180" y="2603500"/>
+            <a:ext cx="6383552" cy="6959600"/>
+          </a:xfrm>
+          <a:prstGeom prst="rect">
+            <a:avLst/>
+          </a:prstGeom>
+        </p:spPr>
+      </p:pic>
+    </p:spTree>
+    <p:extLst>
+      <p:ext uri="{BB962C8B-B14F-4D97-AF65-F5344CB8AC3E}">
+        <p14:creationId xmlns:p14="http://schemas.microsoft.com/office/powerpoint/2010/main" val="2427230543"/>
+      </p:ext>
+    </p:extLst>
+  </p:cSld>
+  <p:clrMapOvr>
+    <a:masterClrMapping/>
+  </p:clrMapOvr>
+  <p:transition spd="med"/>
+</p:sld>
+</file>
+
+<file path=ppt/slides/slide31.xml><?xml version="1.0" encoding="utf-8"?>
+<p:sld xmlns:a="http://schemas.openxmlformats.org/drawingml/2006/main" xmlns:r="http://schemas.openxmlformats.org/officeDocument/2006/relationships" xmlns:p="http://schemas.openxmlformats.org/presentationml/2006/main">
+  <p:cSld>
+    <p:spTree>
+      <p:nvGrpSpPr>
+        <p:cNvPr id="1" name=""/>
+        <p:cNvGrpSpPr/>
+        <p:nvPr/>
+      </p:nvGrpSpPr>
+      <p:grpSpPr>
+        <a:xfrm>
+          <a:off x="0" y="0"/>
+          <a:ext cx="0" cy="0"/>
+          <a:chOff x="0" y="0"/>
+          <a:chExt cx="0" cy="0"/>
+        </a:xfrm>
+      </p:grpSpPr>
+      <p:sp>
+        <p:nvSpPr>
+          <p:cNvPr id="2" name="Title 1"/>
+          <p:cNvSpPr>
+            <a:spLocks noGrp="1"/>
+          </p:cNvSpPr>
+          <p:nvPr>
+            <p:ph type="title"/>
+          </p:nvPr>
+        </p:nvSpPr>
+        <p:spPr/>
+        <p:txBody>
+          <a:bodyPr/>
+          <a:lstStyle/>
+          <a:p>
+            <a:r>
+              <a:rPr lang="en-US" dirty="0" smtClean="0"/>
               <a:t>Run With Coverage</a:t>
             </a:r>
             <a:endParaRPr lang="en-US" dirty="0"/>
@@ -9139,7 +9423,7 @@
 </p:sld>
 </file>
 
-<file path=ppt/slides/slide31.xml><?xml version="1.0" encoding="utf-8"?>
+<file path=ppt/slides/slide32.xml><?xml version="1.0" encoding="utf-8"?>
 <p:sld xmlns:a="http://schemas.openxmlformats.org/drawingml/2006/main" xmlns:r="http://schemas.openxmlformats.org/officeDocument/2006/relationships" xmlns:p="http://schemas.openxmlformats.org/presentationml/2006/main">
   <p:cSld>
     <p:spTree>
@@ -9462,7 +9746,7 @@
           </a:ln>
           <a:extLst>
             <a:ext uri="{C572A759-6A51-4108-AA02-DFA0A04FC94B}">
-              <ma14:wrappingTextBoxFlag xmlns:ma14="http://schemas.microsoft.com/office/mac/drawingml/2011/main" xmlns="" val="1"/>
+              <ma14:wrappingTextBoxFlag xmlns="" xmlns:ma14="http://schemas.microsoft.com/office/mac/drawingml/2011/main" val="1"/>
             </a:ext>
           </a:extLst>
         </p:spPr>
@@ -9799,7 +10083,7 @@
           </a:ln>
           <a:extLst>
             <a:ext uri="{C572A759-6A51-4108-AA02-DFA0A04FC94B}">
-              <ma14:wrappingTextBoxFlag xmlns:ma14="http://schemas.microsoft.com/office/mac/drawingml/2011/main" xmlns="" val="1"/>
+              <ma14:wrappingTextBoxFlag xmlns="" xmlns:ma14="http://schemas.microsoft.com/office/mac/drawingml/2011/main" val="1"/>
             </a:ext>
           </a:extLst>
         </p:spPr>

</xml_diff>

<commit_message>
working on les01 and les02
</commit_message>
<xml_diff>
--- a/docs/slides/01/01_intro.pptx
+++ b/docs/slides/01/01_intro.pptx
@@ -5,7 +5,7 @@
     <p:sldMasterId id="2147483648" r:id="rId1"/>
   </p:sldMasterIdLst>
   <p:notesMasterIdLst>
-    <p:notesMasterId r:id="rId45"/>
+    <p:notesMasterId r:id="rId47"/>
   </p:notesMasterIdLst>
   <p:sldIdLst>
     <p:sldId id="287" r:id="rId2"/>
@@ -37,20 +37,22 @@
     <p:sldId id="292" r:id="rId28"/>
     <p:sldId id="295" r:id="rId29"/>
     <p:sldId id="305" r:id="rId30"/>
-    <p:sldId id="317" r:id="rId31"/>
-    <p:sldId id="296" r:id="rId32"/>
-    <p:sldId id="293" r:id="rId33"/>
-    <p:sldId id="291" r:id="rId34"/>
-    <p:sldId id="297" r:id="rId35"/>
-    <p:sldId id="298" r:id="rId36"/>
-    <p:sldId id="299" r:id="rId37"/>
-    <p:sldId id="301" r:id="rId38"/>
-    <p:sldId id="302" r:id="rId39"/>
-    <p:sldId id="300" r:id="rId40"/>
-    <p:sldId id="304" r:id="rId41"/>
-    <p:sldId id="303" r:id="rId42"/>
-    <p:sldId id="318" r:id="rId43"/>
-    <p:sldId id="294" r:id="rId44"/>
+    <p:sldId id="319" r:id="rId31"/>
+    <p:sldId id="320" r:id="rId32"/>
+    <p:sldId id="317" r:id="rId33"/>
+    <p:sldId id="296" r:id="rId34"/>
+    <p:sldId id="293" r:id="rId35"/>
+    <p:sldId id="291" r:id="rId36"/>
+    <p:sldId id="297" r:id="rId37"/>
+    <p:sldId id="298" r:id="rId38"/>
+    <p:sldId id="299" r:id="rId39"/>
+    <p:sldId id="301" r:id="rId40"/>
+    <p:sldId id="302" r:id="rId41"/>
+    <p:sldId id="300" r:id="rId42"/>
+    <p:sldId id="304" r:id="rId43"/>
+    <p:sldId id="303" r:id="rId44"/>
+    <p:sldId id="318" r:id="rId45"/>
+    <p:sldId id="294" r:id="rId46"/>
   </p:sldIdLst>
   <p:sldSz cx="13004800" cy="9753600"/>
   <p:notesSz cx="6858000" cy="9144000"/>
@@ -1231,7 +1233,7 @@
           <a:p>
             <a:fld id="{04F1D4A2-813C-F741-B481-C92B3A596030}" type="datetimeFigureOut">
               <a:rPr lang="en-US" smtClean="0"/>
-              <a:t>03-Jun-19</a:t>
+              <a:t>04-Jun-19</a:t>
             </a:fld>
             <a:endParaRPr lang="en-US"/>
           </a:p>
@@ -2506,7 +2508,7 @@
           </a:ln>
           <a:extLst>
             <a:ext uri="{C572A759-6A51-4108-AA02-DFA0A04FC94B}">
-              <ma14:wrappingTextBoxFlag xmlns="" xmlns:ma14="http://schemas.microsoft.com/office/mac/drawingml/2011/main" val="1"/>
+              <ma14:wrappingTextBoxFlag xmlns:ma14="http://schemas.microsoft.com/office/mac/drawingml/2011/main" xmlns="" val="1"/>
             </a:ext>
           </a:extLst>
         </p:spPr>
@@ -2545,7 +2547,7 @@
           </a:ln>
           <a:extLst>
             <a:ext uri="{C572A759-6A51-4108-AA02-DFA0A04FC94B}">
-              <ma14:wrappingTextBoxFlag xmlns="" xmlns:ma14="http://schemas.microsoft.com/office/mac/drawingml/2011/main" val="1"/>
+              <ma14:wrappingTextBoxFlag xmlns:ma14="http://schemas.microsoft.com/office/mac/drawingml/2011/main" xmlns="" val="1"/>
             </a:ext>
           </a:extLst>
         </p:spPr>
@@ -3493,11 +3495,7 @@
             </a:br>
             <a:r>
               <a:rPr lang="en-US" dirty="0" smtClean="0"/>
-              <a:t>Lesson 01</a:t>
-            </a:r>
-            <a:r>
-              <a:rPr lang="en-US" dirty="0" smtClean="0"/>
-              <a:t>: Arrays, Lists, and Unit Tests </a:t>
+              <a:t>Lesson 01: Arrays, Lists, and Unit Tests </a:t>
             </a:r>
             <a:endParaRPr lang="en-US" dirty="0"/>
           </a:p>
@@ -4897,7 +4895,7 @@
           </a:ln>
           <a:extLst>
             <a:ext uri="{C572A759-6A51-4108-AA02-DFA0A04FC94B}">
-              <ma14:wrappingTextBoxFlag xmlns:ma14="http://schemas.microsoft.com/office/mac/drawingml/2011/main" xmlns="" val="1"/>
+              <ma14:wrappingTextBoxFlag xmlns="" xmlns:ma14="http://schemas.microsoft.com/office/mac/drawingml/2011/main" val="1"/>
             </a:ext>
           </a:extLst>
         </p:spPr>
@@ -6650,11 +6648,7 @@
             </a:r>
             <a:r>
               <a:rPr lang="en-US" dirty="0" smtClean="0"/>
-              <a:t> with different </a:t>
-            </a:r>
-            <a:r>
-              <a:rPr lang="en-US" dirty="0" smtClean="0"/>
-              <a:t>properties</a:t>
+              <a:t> with different properties</a:t>
             </a:r>
           </a:p>
           <a:p>
@@ -7411,7 +7405,7 @@
         </p:spPr>
         <p:txBody>
           <a:bodyPr>
-            <a:normAutofit fontScale="92500"/>
+            <a:normAutofit/>
           </a:bodyPr>
           <a:lstStyle/>
           <a:p>
@@ -7442,42 +7436,13 @@
           <a:p>
             <a:r>
               <a:rPr lang="en-US" dirty="0" smtClean="0"/>
-              <a:t>Lists (and all data structures will see in this course) are Java objects, and not treated specially like arrays</a:t>
-            </a:r>
-          </a:p>
-          <a:p>
-            <a:r>
-              <a:rPr lang="en-US" dirty="0" smtClean="0"/>
-              <a:t>2 main ways to “</a:t>
-            </a:r>
-            <a:r>
-              <a:rPr lang="en-US" i="1" dirty="0" smtClean="0"/>
-              <a:t>implement</a:t>
-            </a:r>
-            <a:r>
-              <a:rPr lang="en-US" dirty="0" smtClean="0"/>
-              <a:t>” them</a:t>
-            </a:r>
-          </a:p>
-          <a:p>
-            <a:r>
-              <a:rPr lang="en-US" i="1" dirty="0" smtClean="0"/>
-              <a:t>Array-backed</a:t>
-            </a:r>
-            <a:r>
-              <a:rPr lang="en-US" dirty="0" smtClean="0"/>
-              <a:t>: internally storing an array. Need to create new one and move over old data when full.</a:t>
-            </a:r>
-          </a:p>
-          <a:p>
-            <a:r>
-              <a:rPr lang="en-US" i="1" dirty="0" smtClean="0"/>
-              <a:t>Linked-nodes</a:t>
-            </a:r>
-            <a:r>
-              <a:rPr lang="en-US" dirty="0" smtClean="0"/>
-              <a:t>: each element has its own node object, and nodes are connected with object pointers/links (see next slide)</a:t>
-            </a:r>
+              <a:t>Lists (and all data structures will see in this course) are Java objects, and not treated specially like </a:t>
+            </a:r>
+            <a:r>
+              <a:rPr lang="en-US" dirty="0" smtClean="0"/>
+              <a:t>arrays</a:t>
+            </a:r>
+            <a:endParaRPr lang="en-US" dirty="0" smtClean="0"/>
           </a:p>
         </p:txBody>
       </p:sp>
@@ -7683,7 +7648,7 @@
           <a:p>
             <a:r>
               <a:rPr lang="en-US" dirty="0" smtClean="0"/>
-              <a:t>TODO</a:t>
+              <a:t>List Operations</a:t>
             </a:r>
             <a:endParaRPr lang="en-US" dirty="0"/>
           </a:p>
@@ -7711,6 +7676,227 @@
     </p:spTree>
     <p:extLst>
       <p:ext uri="{BB962C8B-B14F-4D97-AF65-F5344CB8AC3E}">
+        <p14:creationId xmlns:p14="http://schemas.microsoft.com/office/powerpoint/2010/main" val="3713328219"/>
+      </p:ext>
+    </p:extLst>
+  </p:cSld>
+  <p:clrMapOvr>
+    <a:masterClrMapping/>
+  </p:clrMapOvr>
+  <p:transition spd="med"/>
+</p:sld>
+</file>
+
+<file path=ppt/slides/slide31.xml><?xml version="1.0" encoding="utf-8"?>
+<p:sld xmlns:a="http://schemas.openxmlformats.org/drawingml/2006/main" xmlns:r="http://schemas.openxmlformats.org/officeDocument/2006/relationships" xmlns:p="http://schemas.openxmlformats.org/presentationml/2006/main">
+  <p:cSld>
+    <p:spTree>
+      <p:nvGrpSpPr>
+        <p:cNvPr id="1" name=""/>
+        <p:cNvGrpSpPr/>
+        <p:nvPr/>
+      </p:nvGrpSpPr>
+      <p:grpSpPr>
+        <a:xfrm>
+          <a:off x="0" y="0"/>
+          <a:ext cx="0" cy="0"/>
+          <a:chOff x="0" y="0"/>
+          <a:chExt cx="0" cy="0"/>
+        </a:xfrm>
+      </p:grpSpPr>
+      <p:sp>
+        <p:nvSpPr>
+          <p:cNvPr id="2" name="Title 1"/>
+          <p:cNvSpPr>
+            <a:spLocks noGrp="1"/>
+          </p:cNvSpPr>
+          <p:nvPr>
+            <p:ph type="title"/>
+          </p:nvPr>
+        </p:nvSpPr>
+        <p:spPr/>
+        <p:txBody>
+          <a:bodyPr/>
+          <a:lstStyle/>
+          <a:p>
+            <a:r>
+              <a:rPr lang="en-US" dirty="0" smtClean="0"/>
+              <a:t>List Implementations</a:t>
+            </a:r>
+            <a:endParaRPr lang="en-US" dirty="0"/>
+          </a:p>
+        </p:txBody>
+      </p:sp>
+      <p:sp>
+        <p:nvSpPr>
+          <p:cNvPr id="3" name="Text Placeholder 2"/>
+          <p:cNvSpPr>
+            <a:spLocks noGrp="1"/>
+          </p:cNvSpPr>
+          <p:nvPr>
+            <p:ph type="body" idx="1"/>
+          </p:nvPr>
+        </p:nvSpPr>
+        <p:spPr/>
+        <p:txBody>
+          <a:bodyPr/>
+          <a:lstStyle/>
+          <a:p>
+            <a:r>
+              <a:rPr lang="en-US" dirty="0"/>
+              <a:t>2 main ways to “</a:t>
+            </a:r>
+            <a:r>
+              <a:rPr lang="en-US" i="1" dirty="0"/>
+              <a:t>implement</a:t>
+            </a:r>
+            <a:r>
+              <a:rPr lang="en-US" dirty="0"/>
+              <a:t>” </a:t>
+            </a:r>
+            <a:r>
+              <a:rPr lang="en-US" dirty="0" smtClean="0"/>
+              <a:t>a list</a:t>
+            </a:r>
+            <a:endParaRPr lang="en-US" dirty="0"/>
+          </a:p>
+          <a:p>
+            <a:r>
+              <a:rPr lang="en-US" i="1" dirty="0"/>
+              <a:t>Array-backed</a:t>
+            </a:r>
+            <a:r>
+              <a:rPr lang="en-US" dirty="0"/>
+              <a:t>: internally storing an </a:t>
+            </a:r>
+            <a:r>
+              <a:rPr lang="en-US" dirty="0" smtClean="0"/>
+              <a:t>array</a:t>
+            </a:r>
+          </a:p>
+          <a:p>
+            <a:pPr lvl="1"/>
+            <a:r>
+              <a:rPr lang="en-US" dirty="0" smtClean="0"/>
+              <a:t>Need </a:t>
+            </a:r>
+            <a:r>
+              <a:rPr lang="en-US" dirty="0"/>
+              <a:t>to create new one and move over old data when </a:t>
+            </a:r>
+            <a:r>
+              <a:rPr lang="en-US" dirty="0" smtClean="0"/>
+              <a:t>full</a:t>
+            </a:r>
+            <a:endParaRPr lang="en-US" dirty="0"/>
+          </a:p>
+          <a:p>
+            <a:r>
+              <a:rPr lang="en-US" i="1" dirty="0"/>
+              <a:t>Linked-nodes</a:t>
+            </a:r>
+            <a:r>
+              <a:rPr lang="en-US" dirty="0"/>
+              <a:t>: each element has its own node </a:t>
+            </a:r>
+            <a:r>
+              <a:rPr lang="en-US" dirty="0" smtClean="0"/>
+              <a:t>object</a:t>
+            </a:r>
+            <a:endParaRPr lang="en-US" dirty="0"/>
+          </a:p>
+          <a:p>
+            <a:pPr lvl="1"/>
+            <a:r>
+              <a:rPr lang="en-US" dirty="0" smtClean="0"/>
+              <a:t>nodes </a:t>
+            </a:r>
+            <a:r>
+              <a:rPr lang="en-US" dirty="0"/>
+              <a:t>are connected with object pointers/links (see next slide)</a:t>
+            </a:r>
+          </a:p>
+          <a:p>
+            <a:endParaRPr lang="en-US" dirty="0"/>
+          </a:p>
+        </p:txBody>
+      </p:sp>
+    </p:spTree>
+    <p:extLst>
+      <p:ext uri="{BB962C8B-B14F-4D97-AF65-F5344CB8AC3E}">
+        <p14:creationId xmlns:p14="http://schemas.microsoft.com/office/powerpoint/2010/main" val="1264656627"/>
+      </p:ext>
+    </p:extLst>
+  </p:cSld>
+  <p:clrMapOvr>
+    <a:masterClrMapping/>
+  </p:clrMapOvr>
+  <p:transition spd="med"/>
+</p:sld>
+</file>
+
+<file path=ppt/slides/slide32.xml><?xml version="1.0" encoding="utf-8"?>
+<p:sld xmlns:a="http://schemas.openxmlformats.org/drawingml/2006/main" xmlns:r="http://schemas.openxmlformats.org/officeDocument/2006/relationships" xmlns:p="http://schemas.openxmlformats.org/presentationml/2006/main">
+  <p:cSld>
+    <p:spTree>
+      <p:nvGrpSpPr>
+        <p:cNvPr id="1" name=""/>
+        <p:cNvGrpSpPr/>
+        <p:nvPr/>
+      </p:nvGrpSpPr>
+      <p:grpSpPr>
+        <a:xfrm>
+          <a:off x="0" y="0"/>
+          <a:ext cx="0" cy="0"/>
+          <a:chOff x="0" y="0"/>
+          <a:chExt cx="0" cy="0"/>
+        </a:xfrm>
+      </p:grpSpPr>
+      <p:sp>
+        <p:nvSpPr>
+          <p:cNvPr id="2" name="Title 1"/>
+          <p:cNvSpPr>
+            <a:spLocks noGrp="1"/>
+          </p:cNvSpPr>
+          <p:nvPr>
+            <p:ph type="title"/>
+          </p:nvPr>
+        </p:nvSpPr>
+        <p:spPr/>
+        <p:txBody>
+          <a:bodyPr/>
+          <a:lstStyle/>
+          <a:p>
+            <a:r>
+              <a:rPr lang="en-US" dirty="0" smtClean="0"/>
+              <a:t>TODO</a:t>
+            </a:r>
+            <a:endParaRPr lang="en-US" dirty="0"/>
+          </a:p>
+        </p:txBody>
+      </p:sp>
+      <p:sp>
+        <p:nvSpPr>
+          <p:cNvPr id="3" name="Text Placeholder 2"/>
+          <p:cNvSpPr>
+            <a:spLocks noGrp="1"/>
+          </p:cNvSpPr>
+          <p:nvPr>
+            <p:ph type="body" idx="1"/>
+          </p:nvPr>
+        </p:nvSpPr>
+        <p:spPr/>
+        <p:txBody>
+          <a:bodyPr/>
+          <a:lstStyle/>
+          <a:p>
+            <a:endParaRPr lang="en-US"/>
+          </a:p>
+        </p:txBody>
+      </p:sp>
+    </p:spTree>
+    <p:extLst>
+      <p:ext uri="{BB962C8B-B14F-4D97-AF65-F5344CB8AC3E}">
         <p14:creationId xmlns:p14="http://schemas.microsoft.com/office/powerpoint/2010/main" val="3513745660"/>
       </p:ext>
     </p:extLst>
@@ -7722,7 +7908,7 @@
 </p:sld>
 </file>
 
-<file path=ppt/slides/slide31.xml><?xml version="1.0" encoding="utf-8"?>
+<file path=ppt/slides/slide33.xml><?xml version="1.0" encoding="utf-8"?>
 <p:sld xmlns:a="http://schemas.openxmlformats.org/drawingml/2006/main" xmlns:r="http://schemas.openxmlformats.org/officeDocument/2006/relationships" xmlns:p="http://schemas.openxmlformats.org/presentationml/2006/main">
   <p:cSld>
     <p:spTree>
@@ -8501,7 +8687,7 @@
 </p:sld>
 </file>
 
-<file path=ppt/slides/slide32.xml><?xml version="1.0" encoding="utf-8"?>
+<file path=ppt/slides/slide34.xml><?xml version="1.0" encoding="utf-8"?>
 <p:sld xmlns:a="http://schemas.openxmlformats.org/drawingml/2006/main" xmlns:r="http://schemas.openxmlformats.org/officeDocument/2006/relationships" xmlns:p="http://schemas.openxmlformats.org/presentationml/2006/main">
   <p:cSld>
     <p:spTree>
@@ -8555,7 +8741,7 @@
 </p:sld>
 </file>
 
-<file path=ppt/slides/slide33.xml><?xml version="1.0" encoding="utf-8"?>
+<file path=ppt/slides/slide35.xml><?xml version="1.0" encoding="utf-8"?>
 <p:sld xmlns:a="http://schemas.openxmlformats.org/drawingml/2006/main" xmlns:r="http://schemas.openxmlformats.org/officeDocument/2006/relationships" xmlns:p="http://schemas.openxmlformats.org/presentationml/2006/main">
   <p:cSld>
     <p:spTree>
@@ -8664,7 +8850,7 @@
 </p:sld>
 </file>
 
-<file path=ppt/slides/slide34.xml><?xml version="1.0" encoding="utf-8"?>
+<file path=ppt/slides/slide36.xml><?xml version="1.0" encoding="utf-8"?>
 <p:sld xmlns:a="http://schemas.openxmlformats.org/drawingml/2006/main" xmlns:r="http://schemas.openxmlformats.org/officeDocument/2006/relationships" xmlns:p="http://schemas.openxmlformats.org/presentationml/2006/main">
   <p:cSld>
     <p:spTree>
@@ -9384,330 +9570,6 @@
 </p:sld>
 </file>
 
-<file path=ppt/slides/slide35.xml><?xml version="1.0" encoding="utf-8"?>
-<p:sld xmlns:a="http://schemas.openxmlformats.org/drawingml/2006/main" xmlns:r="http://schemas.openxmlformats.org/officeDocument/2006/relationships" xmlns:p="http://schemas.openxmlformats.org/presentationml/2006/main">
-  <p:cSld>
-    <p:spTree>
-      <p:nvGrpSpPr>
-        <p:cNvPr id="1" name=""/>
-        <p:cNvGrpSpPr/>
-        <p:nvPr/>
-      </p:nvGrpSpPr>
-      <p:grpSpPr>
-        <a:xfrm>
-          <a:off x="0" y="0"/>
-          <a:ext cx="0" cy="0"/>
-          <a:chOff x="0" y="0"/>
-          <a:chExt cx="0" cy="0"/>
-        </a:xfrm>
-      </p:grpSpPr>
-      <p:sp>
-        <p:nvSpPr>
-          <p:cNvPr id="2" name="Title 1"/>
-          <p:cNvSpPr>
-            <a:spLocks noGrp="1"/>
-          </p:cNvSpPr>
-          <p:nvPr>
-            <p:ph type="title"/>
-          </p:nvPr>
-        </p:nvSpPr>
-        <p:spPr/>
-        <p:txBody>
-          <a:bodyPr/>
-          <a:lstStyle/>
-          <a:p>
-            <a:r>
-              <a:rPr lang="en-US" dirty="0" smtClean="0"/>
-              <a:t>Writing Unit Tests</a:t>
-            </a:r>
-            <a:endParaRPr lang="en-US" dirty="0"/>
-          </a:p>
-        </p:txBody>
-      </p:sp>
-      <p:sp>
-        <p:nvSpPr>
-          <p:cNvPr id="3" name="Text Placeholder 2"/>
-          <p:cNvSpPr>
-            <a:spLocks noGrp="1"/>
-          </p:cNvSpPr>
-          <p:nvPr>
-            <p:ph type="body" idx="1"/>
-          </p:nvPr>
-        </p:nvSpPr>
-        <p:spPr>
-          <a:xfrm>
-            <a:off x="405353" y="2603499"/>
-            <a:ext cx="12330259" cy="6945854"/>
-          </a:xfrm>
-        </p:spPr>
-        <p:txBody>
-          <a:bodyPr>
-            <a:normAutofit lnSpcReduction="10000"/>
-          </a:bodyPr>
-          <a:lstStyle/>
-          <a:p>
-            <a:r>
-              <a:rPr lang="en-US" dirty="0" smtClean="0"/>
-              <a:t>Using a library called </a:t>
-            </a:r>
-            <a:r>
-              <a:rPr lang="en-US" b="1" dirty="0" smtClean="0"/>
-              <a:t>JUnit</a:t>
-            </a:r>
-          </a:p>
-          <a:p>
-            <a:pPr lvl="1"/>
-            <a:r>
-              <a:rPr lang="en-US" dirty="0" smtClean="0"/>
-              <a:t>Note: how to configure </a:t>
-            </a:r>
-            <a:r>
-              <a:rPr lang="en-US" i="1" dirty="0" smtClean="0"/>
-              <a:t>Maven</a:t>
-            </a:r>
-            <a:r>
-              <a:rPr lang="en-US" dirty="0" smtClean="0"/>
-              <a:t> to import third-party libraries is not part of this course (and so not on the exam), but you can ask me in the breaks if you are curious (for some of you, we will dig into its low level details in Enterprise Programming 1 next semester)</a:t>
-            </a:r>
-          </a:p>
-          <a:p>
-            <a:r>
-              <a:rPr lang="en-US" dirty="0" smtClean="0"/>
-              <a:t>Regular code in “</a:t>
-            </a:r>
-            <a:r>
-              <a:rPr lang="en-US" i="1" dirty="0" err="1" smtClean="0"/>
-              <a:t>src</a:t>
-            </a:r>
-            <a:r>
-              <a:rPr lang="en-US" i="1" dirty="0" smtClean="0"/>
-              <a:t>/main/java</a:t>
-            </a:r>
-            <a:r>
-              <a:rPr lang="en-US" dirty="0" smtClean="0"/>
-              <a:t>” folder</a:t>
-            </a:r>
-          </a:p>
-          <a:p>
-            <a:r>
-              <a:rPr lang="en-US" dirty="0" smtClean="0"/>
-              <a:t>Test </a:t>
-            </a:r>
-            <a:r>
-              <a:rPr lang="en-US" dirty="0"/>
-              <a:t>code in “</a:t>
-            </a:r>
-            <a:r>
-              <a:rPr lang="en-US" i="1" dirty="0" err="1" smtClean="0"/>
-              <a:t>src</a:t>
-            </a:r>
-            <a:r>
-              <a:rPr lang="en-US" i="1" dirty="0" smtClean="0"/>
-              <a:t>/test/java</a:t>
-            </a:r>
-            <a:r>
-              <a:rPr lang="en-US" dirty="0"/>
-              <a:t>” </a:t>
-            </a:r>
-            <a:r>
-              <a:rPr lang="en-US" dirty="0" smtClean="0"/>
-              <a:t>folder</a:t>
-            </a:r>
-          </a:p>
-          <a:p>
-            <a:r>
-              <a:rPr lang="en-US" dirty="0" smtClean="0"/>
-              <a:t>A test class is just a Java class with </a:t>
-            </a:r>
-            <a:r>
-              <a:rPr lang="en-US" i="1" dirty="0" smtClean="0"/>
-              <a:t>@ annotations</a:t>
-            </a:r>
-          </a:p>
-          <a:p>
-            <a:r>
-              <a:rPr lang="en-US" dirty="0" smtClean="0"/>
-              <a:t>A test class for a class called </a:t>
-            </a:r>
-            <a:r>
-              <a:rPr lang="en-US" i="1" dirty="0" smtClean="0"/>
-              <a:t>Foo.java</a:t>
-            </a:r>
-            <a:r>
-              <a:rPr lang="en-US" dirty="0" smtClean="0"/>
-              <a:t> will be called </a:t>
-            </a:r>
-            <a:r>
-              <a:rPr lang="en-US" i="1" dirty="0" smtClean="0"/>
-              <a:t>FooTest.java</a:t>
-            </a:r>
-            <a:r>
-              <a:rPr lang="en-US" dirty="0" smtClean="0"/>
-              <a:t>, in the same package</a:t>
-            </a:r>
-            <a:endParaRPr lang="en-US" i="1" dirty="0"/>
-          </a:p>
-        </p:txBody>
-      </p:sp>
-    </p:spTree>
-    <p:extLst>
-      <p:ext uri="{BB962C8B-B14F-4D97-AF65-F5344CB8AC3E}">
-        <p14:creationId xmlns:p14="http://schemas.microsoft.com/office/powerpoint/2010/main" val="3303595683"/>
-      </p:ext>
-    </p:extLst>
-  </p:cSld>
-  <p:clrMapOvr>
-    <a:masterClrMapping/>
-  </p:clrMapOvr>
-  <p:transition spd="med"/>
-</p:sld>
-</file>
-
-<file path=ppt/slides/slide36.xml><?xml version="1.0" encoding="utf-8"?>
-<p:sld xmlns:a="http://schemas.openxmlformats.org/drawingml/2006/main" xmlns:r="http://schemas.openxmlformats.org/officeDocument/2006/relationships" xmlns:p="http://schemas.openxmlformats.org/presentationml/2006/main">
-  <p:cSld>
-    <p:spTree>
-      <p:nvGrpSpPr>
-        <p:cNvPr id="1" name=""/>
-        <p:cNvGrpSpPr/>
-        <p:nvPr/>
-      </p:nvGrpSpPr>
-      <p:grpSpPr>
-        <a:xfrm>
-          <a:off x="0" y="0"/>
-          <a:ext cx="0" cy="0"/>
-          <a:chOff x="0" y="0"/>
-          <a:chExt cx="0" cy="0"/>
-        </a:xfrm>
-      </p:grpSpPr>
-      <p:sp>
-        <p:nvSpPr>
-          <p:cNvPr id="2" name="Title 1"/>
-          <p:cNvSpPr>
-            <a:spLocks noGrp="1"/>
-          </p:cNvSpPr>
-          <p:nvPr>
-            <p:ph type="title"/>
-          </p:nvPr>
-        </p:nvSpPr>
-        <p:spPr/>
-        <p:txBody>
-          <a:bodyPr/>
-          <a:lstStyle/>
-          <a:p>
-            <a:r>
-              <a:rPr lang="en-US" dirty="0" smtClean="0"/>
-              <a:t>Main @ Annotations</a:t>
-            </a:r>
-            <a:endParaRPr lang="en-US" dirty="0"/>
-          </a:p>
-        </p:txBody>
-      </p:sp>
-      <p:sp>
-        <p:nvSpPr>
-          <p:cNvPr id="3" name="Text Placeholder 2"/>
-          <p:cNvSpPr>
-            <a:spLocks noGrp="1"/>
-          </p:cNvSpPr>
-          <p:nvPr>
-            <p:ph type="body" idx="1"/>
-          </p:nvPr>
-        </p:nvSpPr>
-        <p:spPr/>
-        <p:txBody>
-          <a:bodyPr/>
-          <a:lstStyle/>
-          <a:p>
-            <a:r>
-              <a:rPr lang="en-US" b="1" dirty="0" smtClean="0"/>
-              <a:t>@Test</a:t>
-            </a:r>
-            <a:r>
-              <a:rPr lang="en-US" dirty="0" smtClean="0"/>
-              <a:t>: mark a method as a test</a:t>
-            </a:r>
-          </a:p>
-          <a:p>
-            <a:r>
-              <a:rPr lang="en-US" b="1" dirty="0"/>
-              <a:t>@</a:t>
-            </a:r>
-            <a:r>
-              <a:rPr lang="en-US" b="1" dirty="0" err="1" smtClean="0"/>
-              <a:t>BeforeEach</a:t>
-            </a:r>
-            <a:r>
-              <a:rPr lang="en-US" dirty="0" smtClean="0"/>
-              <a:t>: execute method before each test</a:t>
-            </a:r>
-          </a:p>
-          <a:p>
-            <a:r>
-              <a:rPr lang="en-US" b="1" dirty="0" smtClean="0"/>
-              <a:t>@</a:t>
-            </a:r>
-            <a:r>
-              <a:rPr lang="en-US" b="1" dirty="0" err="1" smtClean="0"/>
-              <a:t>BeforeAll</a:t>
-            </a:r>
-            <a:r>
-              <a:rPr lang="en-US" dirty="0" smtClean="0"/>
-              <a:t>: execute method once before any of the tests is started</a:t>
-            </a:r>
-          </a:p>
-          <a:p>
-            <a:r>
-              <a:rPr lang="en-US" b="1" dirty="0" smtClean="0"/>
-              <a:t>@</a:t>
-            </a:r>
-            <a:r>
-              <a:rPr lang="en-US" b="1" dirty="0" err="1" smtClean="0"/>
-              <a:t>AfterEach</a:t>
-            </a:r>
-            <a:r>
-              <a:rPr lang="en-US" dirty="0" smtClean="0"/>
-              <a:t>, </a:t>
-            </a:r>
-            <a:r>
-              <a:rPr lang="en-US" b="1" dirty="0" smtClean="0"/>
-              <a:t>@</a:t>
-            </a:r>
-            <a:r>
-              <a:rPr lang="en-US" b="1" dirty="0" err="1" smtClean="0"/>
-              <a:t>AfterAll</a:t>
-            </a:r>
-            <a:r>
-              <a:rPr lang="en-US" dirty="0" smtClean="0"/>
-              <a:t>: same, but after the tests </a:t>
-            </a:r>
-          </a:p>
-          <a:p>
-            <a:r>
-              <a:rPr lang="en-US" b="1" dirty="0" smtClean="0"/>
-              <a:t>@Disable</a:t>
-            </a:r>
-            <a:r>
-              <a:rPr lang="en-US" dirty="0" smtClean="0"/>
-              <a:t>: temporarily disable a test, which is not going to be run</a:t>
-            </a:r>
-            <a:endParaRPr lang="en-US" dirty="0"/>
-          </a:p>
-        </p:txBody>
-      </p:sp>
-    </p:spTree>
-    <p:extLst>
-      <p:ext uri="{BB962C8B-B14F-4D97-AF65-F5344CB8AC3E}">
-        <p14:creationId xmlns:p14="http://schemas.microsoft.com/office/powerpoint/2010/main" val="2593368313"/>
-      </p:ext>
-    </p:extLst>
-  </p:cSld>
-  <p:clrMapOvr>
-    <a:masterClrMapping/>
-  </p:clrMapOvr>
-  <p:transition spd="med"/>
-</p:sld>
-</file>
-
 <file path=ppt/slides/slide37.xml><?xml version="1.0" encoding="utf-8"?>
 <p:sld xmlns:a="http://schemas.openxmlformats.org/drawingml/2006/main" xmlns:r="http://schemas.openxmlformats.org/officeDocument/2006/relationships" xmlns:p="http://schemas.openxmlformats.org/presentationml/2006/main">
   <p:cSld>
@@ -9742,6 +9604,330 @@
           <a:p>
             <a:r>
               <a:rPr lang="en-US" dirty="0" smtClean="0"/>
+              <a:t>Writing Unit Tests</a:t>
+            </a:r>
+            <a:endParaRPr lang="en-US" dirty="0"/>
+          </a:p>
+        </p:txBody>
+      </p:sp>
+      <p:sp>
+        <p:nvSpPr>
+          <p:cNvPr id="3" name="Text Placeholder 2"/>
+          <p:cNvSpPr>
+            <a:spLocks noGrp="1"/>
+          </p:cNvSpPr>
+          <p:nvPr>
+            <p:ph type="body" idx="1"/>
+          </p:nvPr>
+        </p:nvSpPr>
+        <p:spPr>
+          <a:xfrm>
+            <a:off x="405353" y="2603499"/>
+            <a:ext cx="12330259" cy="6945854"/>
+          </a:xfrm>
+        </p:spPr>
+        <p:txBody>
+          <a:bodyPr>
+            <a:normAutofit lnSpcReduction="10000"/>
+          </a:bodyPr>
+          <a:lstStyle/>
+          <a:p>
+            <a:r>
+              <a:rPr lang="en-US" dirty="0" smtClean="0"/>
+              <a:t>Using a library called </a:t>
+            </a:r>
+            <a:r>
+              <a:rPr lang="en-US" b="1" dirty="0" smtClean="0"/>
+              <a:t>JUnit</a:t>
+            </a:r>
+          </a:p>
+          <a:p>
+            <a:pPr lvl="1"/>
+            <a:r>
+              <a:rPr lang="en-US" dirty="0" smtClean="0"/>
+              <a:t>Note: how to configure </a:t>
+            </a:r>
+            <a:r>
+              <a:rPr lang="en-US" i="1" dirty="0" smtClean="0"/>
+              <a:t>Maven</a:t>
+            </a:r>
+            <a:r>
+              <a:rPr lang="en-US" dirty="0" smtClean="0"/>
+              <a:t> to import third-party libraries is not part of this course (and so not on the exam), but you can ask me in the breaks if you are curious (for some of you, we will dig into its low level details in Enterprise Programming 1 next semester)</a:t>
+            </a:r>
+          </a:p>
+          <a:p>
+            <a:r>
+              <a:rPr lang="en-US" dirty="0" smtClean="0"/>
+              <a:t>Regular code in “</a:t>
+            </a:r>
+            <a:r>
+              <a:rPr lang="en-US" i="1" dirty="0" err="1" smtClean="0"/>
+              <a:t>src</a:t>
+            </a:r>
+            <a:r>
+              <a:rPr lang="en-US" i="1" dirty="0" smtClean="0"/>
+              <a:t>/main/java</a:t>
+            </a:r>
+            <a:r>
+              <a:rPr lang="en-US" dirty="0" smtClean="0"/>
+              <a:t>” folder</a:t>
+            </a:r>
+          </a:p>
+          <a:p>
+            <a:r>
+              <a:rPr lang="en-US" dirty="0" smtClean="0"/>
+              <a:t>Test </a:t>
+            </a:r>
+            <a:r>
+              <a:rPr lang="en-US" dirty="0"/>
+              <a:t>code in “</a:t>
+            </a:r>
+            <a:r>
+              <a:rPr lang="en-US" i="1" dirty="0" err="1" smtClean="0"/>
+              <a:t>src</a:t>
+            </a:r>
+            <a:r>
+              <a:rPr lang="en-US" i="1" dirty="0" smtClean="0"/>
+              <a:t>/test/java</a:t>
+            </a:r>
+            <a:r>
+              <a:rPr lang="en-US" dirty="0"/>
+              <a:t>” </a:t>
+            </a:r>
+            <a:r>
+              <a:rPr lang="en-US" dirty="0" smtClean="0"/>
+              <a:t>folder</a:t>
+            </a:r>
+          </a:p>
+          <a:p>
+            <a:r>
+              <a:rPr lang="en-US" dirty="0" smtClean="0"/>
+              <a:t>A test class is just a Java class with </a:t>
+            </a:r>
+            <a:r>
+              <a:rPr lang="en-US" i="1" dirty="0" smtClean="0"/>
+              <a:t>@ annotations</a:t>
+            </a:r>
+          </a:p>
+          <a:p>
+            <a:r>
+              <a:rPr lang="en-US" dirty="0" smtClean="0"/>
+              <a:t>A test class for a class called </a:t>
+            </a:r>
+            <a:r>
+              <a:rPr lang="en-US" i="1" dirty="0" smtClean="0"/>
+              <a:t>Foo.java</a:t>
+            </a:r>
+            <a:r>
+              <a:rPr lang="en-US" dirty="0" smtClean="0"/>
+              <a:t> will be called </a:t>
+            </a:r>
+            <a:r>
+              <a:rPr lang="en-US" i="1" dirty="0" smtClean="0"/>
+              <a:t>FooTest.java</a:t>
+            </a:r>
+            <a:r>
+              <a:rPr lang="en-US" dirty="0" smtClean="0"/>
+              <a:t>, in the same package</a:t>
+            </a:r>
+            <a:endParaRPr lang="en-US" i="1" dirty="0"/>
+          </a:p>
+        </p:txBody>
+      </p:sp>
+    </p:spTree>
+    <p:extLst>
+      <p:ext uri="{BB962C8B-B14F-4D97-AF65-F5344CB8AC3E}">
+        <p14:creationId xmlns:p14="http://schemas.microsoft.com/office/powerpoint/2010/main" val="3303595683"/>
+      </p:ext>
+    </p:extLst>
+  </p:cSld>
+  <p:clrMapOvr>
+    <a:masterClrMapping/>
+  </p:clrMapOvr>
+  <p:transition spd="med"/>
+</p:sld>
+</file>
+
+<file path=ppt/slides/slide38.xml><?xml version="1.0" encoding="utf-8"?>
+<p:sld xmlns:a="http://schemas.openxmlformats.org/drawingml/2006/main" xmlns:r="http://schemas.openxmlformats.org/officeDocument/2006/relationships" xmlns:p="http://schemas.openxmlformats.org/presentationml/2006/main">
+  <p:cSld>
+    <p:spTree>
+      <p:nvGrpSpPr>
+        <p:cNvPr id="1" name=""/>
+        <p:cNvGrpSpPr/>
+        <p:nvPr/>
+      </p:nvGrpSpPr>
+      <p:grpSpPr>
+        <a:xfrm>
+          <a:off x="0" y="0"/>
+          <a:ext cx="0" cy="0"/>
+          <a:chOff x="0" y="0"/>
+          <a:chExt cx="0" cy="0"/>
+        </a:xfrm>
+      </p:grpSpPr>
+      <p:sp>
+        <p:nvSpPr>
+          <p:cNvPr id="2" name="Title 1"/>
+          <p:cNvSpPr>
+            <a:spLocks noGrp="1"/>
+          </p:cNvSpPr>
+          <p:nvPr>
+            <p:ph type="title"/>
+          </p:nvPr>
+        </p:nvSpPr>
+        <p:spPr/>
+        <p:txBody>
+          <a:bodyPr/>
+          <a:lstStyle/>
+          <a:p>
+            <a:r>
+              <a:rPr lang="en-US" dirty="0" smtClean="0"/>
+              <a:t>Main @ Annotations</a:t>
+            </a:r>
+            <a:endParaRPr lang="en-US" dirty="0"/>
+          </a:p>
+        </p:txBody>
+      </p:sp>
+      <p:sp>
+        <p:nvSpPr>
+          <p:cNvPr id="3" name="Text Placeholder 2"/>
+          <p:cNvSpPr>
+            <a:spLocks noGrp="1"/>
+          </p:cNvSpPr>
+          <p:nvPr>
+            <p:ph type="body" idx="1"/>
+          </p:nvPr>
+        </p:nvSpPr>
+        <p:spPr/>
+        <p:txBody>
+          <a:bodyPr/>
+          <a:lstStyle/>
+          <a:p>
+            <a:r>
+              <a:rPr lang="en-US" b="1" dirty="0" smtClean="0"/>
+              <a:t>@Test</a:t>
+            </a:r>
+            <a:r>
+              <a:rPr lang="en-US" dirty="0" smtClean="0"/>
+              <a:t>: mark a method as a test</a:t>
+            </a:r>
+          </a:p>
+          <a:p>
+            <a:r>
+              <a:rPr lang="en-US" b="1" dirty="0"/>
+              <a:t>@</a:t>
+            </a:r>
+            <a:r>
+              <a:rPr lang="en-US" b="1" dirty="0" err="1" smtClean="0"/>
+              <a:t>BeforeEach</a:t>
+            </a:r>
+            <a:r>
+              <a:rPr lang="en-US" dirty="0" smtClean="0"/>
+              <a:t>: execute method before each test</a:t>
+            </a:r>
+          </a:p>
+          <a:p>
+            <a:r>
+              <a:rPr lang="en-US" b="1" dirty="0" smtClean="0"/>
+              <a:t>@</a:t>
+            </a:r>
+            <a:r>
+              <a:rPr lang="en-US" b="1" dirty="0" err="1" smtClean="0"/>
+              <a:t>BeforeAll</a:t>
+            </a:r>
+            <a:r>
+              <a:rPr lang="en-US" dirty="0" smtClean="0"/>
+              <a:t>: execute method once before any of the tests is started</a:t>
+            </a:r>
+          </a:p>
+          <a:p>
+            <a:r>
+              <a:rPr lang="en-US" b="1" dirty="0" smtClean="0"/>
+              <a:t>@</a:t>
+            </a:r>
+            <a:r>
+              <a:rPr lang="en-US" b="1" dirty="0" err="1" smtClean="0"/>
+              <a:t>AfterEach</a:t>
+            </a:r>
+            <a:r>
+              <a:rPr lang="en-US" dirty="0" smtClean="0"/>
+              <a:t>, </a:t>
+            </a:r>
+            <a:r>
+              <a:rPr lang="en-US" b="1" dirty="0" smtClean="0"/>
+              <a:t>@</a:t>
+            </a:r>
+            <a:r>
+              <a:rPr lang="en-US" b="1" dirty="0" err="1" smtClean="0"/>
+              <a:t>AfterAll</a:t>
+            </a:r>
+            <a:r>
+              <a:rPr lang="en-US" dirty="0" smtClean="0"/>
+              <a:t>: same, but after the tests </a:t>
+            </a:r>
+          </a:p>
+          <a:p>
+            <a:r>
+              <a:rPr lang="en-US" b="1" dirty="0" smtClean="0"/>
+              <a:t>@Disable</a:t>
+            </a:r>
+            <a:r>
+              <a:rPr lang="en-US" dirty="0" smtClean="0"/>
+              <a:t>: temporarily disable a test, which is not going to be run</a:t>
+            </a:r>
+            <a:endParaRPr lang="en-US" dirty="0"/>
+          </a:p>
+        </p:txBody>
+      </p:sp>
+    </p:spTree>
+    <p:extLst>
+      <p:ext uri="{BB962C8B-B14F-4D97-AF65-F5344CB8AC3E}">
+        <p14:creationId xmlns:p14="http://schemas.microsoft.com/office/powerpoint/2010/main" val="2593368313"/>
+      </p:ext>
+    </p:extLst>
+  </p:cSld>
+  <p:clrMapOvr>
+    <a:masterClrMapping/>
+  </p:clrMapOvr>
+  <p:transition spd="med"/>
+</p:sld>
+</file>
+
+<file path=ppt/slides/slide39.xml><?xml version="1.0" encoding="utf-8"?>
+<p:sld xmlns:a="http://schemas.openxmlformats.org/drawingml/2006/main" xmlns:r="http://schemas.openxmlformats.org/officeDocument/2006/relationships" xmlns:p="http://schemas.openxmlformats.org/presentationml/2006/main">
+  <p:cSld>
+    <p:spTree>
+      <p:nvGrpSpPr>
+        <p:cNvPr id="1" name=""/>
+        <p:cNvGrpSpPr/>
+        <p:nvPr/>
+      </p:nvGrpSpPr>
+      <p:grpSpPr>
+        <a:xfrm>
+          <a:off x="0" y="0"/>
+          <a:ext cx="0" cy="0"/>
+          <a:chOff x="0" y="0"/>
+          <a:chExt cx="0" cy="0"/>
+        </a:xfrm>
+      </p:grpSpPr>
+      <p:sp>
+        <p:nvSpPr>
+          <p:cNvPr id="2" name="Title 1"/>
+          <p:cNvSpPr>
+            <a:spLocks noGrp="1"/>
+          </p:cNvSpPr>
+          <p:nvPr>
+            <p:ph type="title"/>
+          </p:nvPr>
+        </p:nvSpPr>
+        <p:spPr/>
+        <p:txBody>
+          <a:bodyPr/>
+          <a:lstStyle/>
+          <a:p>
+            <a:r>
+              <a:rPr lang="en-US" dirty="0" smtClean="0"/>
               <a:t>Assertions</a:t>
             </a:r>
             <a:endParaRPr lang="en-US" dirty="0"/>
@@ -9930,7 +10116,136 @@
 </p:sld>
 </file>
 
-<file path=ppt/slides/slide38.xml><?xml version="1.0" encoding="utf-8"?>
+<file path=ppt/slides/slide4.xml><?xml version="1.0" encoding="utf-8"?>
+<p:sld xmlns:a="http://schemas.openxmlformats.org/drawingml/2006/main" xmlns:r="http://schemas.openxmlformats.org/officeDocument/2006/relationships" xmlns:p="http://schemas.openxmlformats.org/presentationml/2006/main">
+  <p:cSld>
+    <p:spTree>
+      <p:nvGrpSpPr>
+        <p:cNvPr id="1" name=""/>
+        <p:cNvGrpSpPr/>
+        <p:nvPr/>
+      </p:nvGrpSpPr>
+      <p:grpSpPr>
+        <a:xfrm>
+          <a:off x="0" y="0"/>
+          <a:ext cx="0" cy="0"/>
+          <a:chOff x="0" y="0"/>
+          <a:chExt cx="0" cy="0"/>
+        </a:xfrm>
+      </p:grpSpPr>
+      <p:sp>
+        <p:nvSpPr>
+          <p:cNvPr id="140" name="Shape 140"/>
+          <p:cNvSpPr>
+            <a:spLocks noGrp="1"/>
+          </p:cNvSpPr>
+          <p:nvPr>
+            <p:ph type="title"/>
+          </p:nvPr>
+        </p:nvSpPr>
+        <p:spPr>
+          <a:prstGeom prst="rect">
+            <a:avLst/>
+          </a:prstGeom>
+        </p:spPr>
+        <p:txBody>
+          <a:bodyPr/>
+          <a:lstStyle/>
+          <a:p>
+            <a:r>
+              <a:t>Course Info</a:t>
+            </a:r>
+          </a:p>
+        </p:txBody>
+      </p:sp>
+      <p:sp>
+        <p:nvSpPr>
+          <p:cNvPr id="141" name="Shape 141"/>
+          <p:cNvSpPr>
+            <a:spLocks noGrp="1"/>
+          </p:cNvSpPr>
+          <p:nvPr>
+            <p:ph type="body" idx="1"/>
+          </p:nvPr>
+        </p:nvSpPr>
+        <p:spPr>
+          <a:xfrm>
+            <a:off x="400049" y="2603500"/>
+            <a:ext cx="12163425" cy="6286500"/>
+          </a:xfrm>
+          <a:prstGeom prst="rect">
+            <a:avLst/>
+          </a:prstGeom>
+        </p:spPr>
+        <p:txBody>
+          <a:bodyPr/>
+          <a:lstStyle/>
+          <a:p>
+            <a:r>
+              <a:rPr dirty="0" smtClean="0"/>
+              <a:t>12 </a:t>
+            </a:r>
+            <a:r>
+              <a:rPr dirty="0"/>
+              <a:t>lessons, </a:t>
+            </a:r>
+            <a:r>
+              <a:rPr lang="en-US" dirty="0" smtClean="0"/>
+              <a:t>once </a:t>
+            </a:r>
+            <a:r>
+              <a:rPr dirty="0" smtClean="0"/>
+              <a:t>a weak</a:t>
+            </a:r>
+            <a:endParaRPr lang="en-US" dirty="0" smtClean="0"/>
+          </a:p>
+          <a:p>
+            <a:r>
+              <a:rPr lang="en-US" dirty="0" smtClean="0"/>
+              <a:t>Class 1-9: </a:t>
+            </a:r>
+            <a:r>
+              <a:rPr lang="en-US" i="1" dirty="0" smtClean="0"/>
+              <a:t>Foundation</a:t>
+            </a:r>
+            <a:r>
+              <a:rPr lang="en-US" dirty="0" smtClean="0"/>
+              <a:t>, algorithms and data structures that all of you will need to know if you are going to work as a developer/programmer/engineer/etc.</a:t>
+            </a:r>
+          </a:p>
+          <a:p>
+            <a:r>
+              <a:rPr lang="en-US" dirty="0" smtClean="0"/>
+              <a:t>Class 10-12: </a:t>
+            </a:r>
+            <a:r>
+              <a:rPr lang="en-US" i="1" dirty="0" smtClean="0"/>
+              <a:t>Advanced</a:t>
+            </a:r>
+            <a:r>
+              <a:rPr lang="en-US" dirty="0" smtClean="0"/>
+              <a:t>, interesting and important topics, but that not all of you will need in your daily jobs</a:t>
+            </a:r>
+          </a:p>
+          <a:p>
+            <a:r>
+              <a:rPr lang="en-US" dirty="0" smtClean="0"/>
+              <a:t>Check each week to see if changes in schedule (time and room)</a:t>
+            </a:r>
+            <a:endParaRPr dirty="0"/>
+          </a:p>
+        </p:txBody>
+      </p:sp>
+    </p:spTree>
+  </p:cSld>
+  <p:clrMapOvr>
+    <a:masterClrMapping/>
+  </p:clrMapOvr>
+  <p:transition spd="slow"/>
+</p:sld>
+</file>
+
+<file path=ppt/slides/slide40.xml><?xml version="1.0" encoding="utf-8"?>
 <p:sld xmlns:a="http://schemas.openxmlformats.org/drawingml/2006/main" xmlns:r="http://schemas.openxmlformats.org/officeDocument/2006/relationships" xmlns:p="http://schemas.openxmlformats.org/presentationml/2006/main">
   <p:cSld>
     <p:spTree>
@@ -11312,7 +11627,7 @@
 </p:sld>
 </file>
 
-<file path=ppt/slides/slide39.xml><?xml version="1.0" encoding="utf-8"?>
+<file path=ppt/slides/slide41.xml><?xml version="1.0" encoding="utf-8"?>
 <p:sld xmlns:a="http://schemas.openxmlformats.org/drawingml/2006/main" xmlns:r="http://schemas.openxmlformats.org/officeDocument/2006/relationships" xmlns:p="http://schemas.openxmlformats.org/presentationml/2006/main">
   <p:cSld>
     <p:spTree>
@@ -11463,401 +11778,6 @@
     <p:extLst>
       <p:ext uri="{BB962C8B-B14F-4D97-AF65-F5344CB8AC3E}">
         <p14:creationId xmlns:p14="http://schemas.microsoft.com/office/powerpoint/2010/main" val="3232246092"/>
-      </p:ext>
-    </p:extLst>
-  </p:cSld>
-  <p:clrMapOvr>
-    <a:masterClrMapping/>
-  </p:clrMapOvr>
-  <p:transition spd="med"/>
-</p:sld>
-</file>
-
-<file path=ppt/slides/slide4.xml><?xml version="1.0" encoding="utf-8"?>
-<p:sld xmlns:a="http://schemas.openxmlformats.org/drawingml/2006/main" xmlns:r="http://schemas.openxmlformats.org/officeDocument/2006/relationships" xmlns:p="http://schemas.openxmlformats.org/presentationml/2006/main">
-  <p:cSld>
-    <p:spTree>
-      <p:nvGrpSpPr>
-        <p:cNvPr id="1" name=""/>
-        <p:cNvGrpSpPr/>
-        <p:nvPr/>
-      </p:nvGrpSpPr>
-      <p:grpSpPr>
-        <a:xfrm>
-          <a:off x="0" y="0"/>
-          <a:ext cx="0" cy="0"/>
-          <a:chOff x="0" y="0"/>
-          <a:chExt cx="0" cy="0"/>
-        </a:xfrm>
-      </p:grpSpPr>
-      <p:sp>
-        <p:nvSpPr>
-          <p:cNvPr id="140" name="Shape 140"/>
-          <p:cNvSpPr>
-            <a:spLocks noGrp="1"/>
-          </p:cNvSpPr>
-          <p:nvPr>
-            <p:ph type="title"/>
-          </p:nvPr>
-        </p:nvSpPr>
-        <p:spPr>
-          <a:prstGeom prst="rect">
-            <a:avLst/>
-          </a:prstGeom>
-        </p:spPr>
-        <p:txBody>
-          <a:bodyPr/>
-          <a:lstStyle/>
-          <a:p>
-            <a:r>
-              <a:t>Course Info</a:t>
-            </a:r>
-          </a:p>
-        </p:txBody>
-      </p:sp>
-      <p:sp>
-        <p:nvSpPr>
-          <p:cNvPr id="141" name="Shape 141"/>
-          <p:cNvSpPr>
-            <a:spLocks noGrp="1"/>
-          </p:cNvSpPr>
-          <p:nvPr>
-            <p:ph type="body" idx="1"/>
-          </p:nvPr>
-        </p:nvSpPr>
-        <p:spPr>
-          <a:xfrm>
-            <a:off x="400049" y="2603500"/>
-            <a:ext cx="12163425" cy="6286500"/>
-          </a:xfrm>
-          <a:prstGeom prst="rect">
-            <a:avLst/>
-          </a:prstGeom>
-        </p:spPr>
-        <p:txBody>
-          <a:bodyPr/>
-          <a:lstStyle/>
-          <a:p>
-            <a:r>
-              <a:rPr dirty="0" smtClean="0"/>
-              <a:t>12 </a:t>
-            </a:r>
-            <a:r>
-              <a:rPr dirty="0"/>
-              <a:t>lessons, </a:t>
-            </a:r>
-            <a:r>
-              <a:rPr lang="en-US" dirty="0" smtClean="0"/>
-              <a:t>once </a:t>
-            </a:r>
-            <a:r>
-              <a:rPr dirty="0" smtClean="0"/>
-              <a:t>a weak</a:t>
-            </a:r>
-            <a:endParaRPr lang="en-US" dirty="0" smtClean="0"/>
-          </a:p>
-          <a:p>
-            <a:r>
-              <a:rPr lang="en-US" dirty="0" smtClean="0"/>
-              <a:t>Class 1-9: </a:t>
-            </a:r>
-            <a:r>
-              <a:rPr lang="en-US" i="1" dirty="0" smtClean="0"/>
-              <a:t>Foundation</a:t>
-            </a:r>
-            <a:r>
-              <a:rPr lang="en-US" dirty="0" smtClean="0"/>
-              <a:t>, algorithms and data structures that all of you will need to know if you are going to work as a developer/programmer/engineer/etc.</a:t>
-            </a:r>
-          </a:p>
-          <a:p>
-            <a:r>
-              <a:rPr lang="en-US" dirty="0" smtClean="0"/>
-              <a:t>Class 10-12: </a:t>
-            </a:r>
-            <a:r>
-              <a:rPr lang="en-US" i="1" dirty="0" smtClean="0"/>
-              <a:t>Advanced</a:t>
-            </a:r>
-            <a:r>
-              <a:rPr lang="en-US" dirty="0" smtClean="0"/>
-              <a:t>, interesting and important topics, but that not all of you will need in your daily jobs</a:t>
-            </a:r>
-          </a:p>
-          <a:p>
-            <a:r>
-              <a:rPr lang="en-US" dirty="0" smtClean="0"/>
-              <a:t>Check each week to see if changes in schedule (time and room)</a:t>
-            </a:r>
-            <a:endParaRPr dirty="0"/>
-          </a:p>
-        </p:txBody>
-      </p:sp>
-    </p:spTree>
-  </p:cSld>
-  <p:clrMapOvr>
-    <a:masterClrMapping/>
-  </p:clrMapOvr>
-  <p:transition spd="slow"/>
-</p:sld>
-</file>
-
-<file path=ppt/slides/slide40.xml><?xml version="1.0" encoding="utf-8"?>
-<p:sld xmlns:a="http://schemas.openxmlformats.org/drawingml/2006/main" xmlns:r="http://schemas.openxmlformats.org/officeDocument/2006/relationships" xmlns:p="http://schemas.openxmlformats.org/presentationml/2006/main">
-  <p:cSld>
-    <p:spTree>
-      <p:nvGrpSpPr>
-        <p:cNvPr id="1" name=""/>
-        <p:cNvGrpSpPr/>
-        <p:nvPr/>
-      </p:nvGrpSpPr>
-      <p:grpSpPr>
-        <a:xfrm>
-          <a:off x="0" y="0"/>
-          <a:ext cx="0" cy="0"/>
-          <a:chOff x="0" y="0"/>
-          <a:chExt cx="0" cy="0"/>
-        </a:xfrm>
-      </p:grpSpPr>
-      <p:sp>
-        <p:nvSpPr>
-          <p:cNvPr id="2" name="Title 1"/>
-          <p:cNvSpPr>
-            <a:spLocks noGrp="1"/>
-          </p:cNvSpPr>
-          <p:nvPr>
-            <p:ph type="title"/>
-          </p:nvPr>
-        </p:nvSpPr>
-        <p:spPr/>
-        <p:txBody>
-          <a:bodyPr/>
-          <a:lstStyle/>
-          <a:p>
-            <a:r>
-              <a:rPr lang="en-US" dirty="0" smtClean="0"/>
-              <a:t>Run With Coverage</a:t>
-            </a:r>
-            <a:endParaRPr lang="en-US" dirty="0"/>
-          </a:p>
-        </p:txBody>
-      </p:sp>
-      <p:sp>
-        <p:nvSpPr>
-          <p:cNvPr id="3" name="Text Placeholder 2"/>
-          <p:cNvSpPr>
-            <a:spLocks noGrp="1"/>
-          </p:cNvSpPr>
-          <p:nvPr>
-            <p:ph type="body" idx="1"/>
-          </p:nvPr>
-        </p:nvSpPr>
-        <p:spPr>
-          <a:xfrm>
-            <a:off x="9658350" y="2603500"/>
-            <a:ext cx="2971800" cy="6286500"/>
-          </a:xfrm>
-        </p:spPr>
-        <p:txBody>
-          <a:bodyPr>
-            <a:normAutofit fontScale="92500" lnSpcReduction="10000"/>
-          </a:bodyPr>
-          <a:lstStyle/>
-          <a:p>
-            <a:r>
-              <a:rPr lang="en-US" dirty="0" smtClean="0"/>
-              <a:t>Can tell you how much of the code is executed</a:t>
-            </a:r>
-          </a:p>
-          <a:p>
-            <a:r>
-              <a:rPr lang="en-US" dirty="0" err="1"/>
-              <a:t>E</a:t>
-            </a:r>
-            <a:r>
-              <a:rPr lang="en-US" dirty="0" err="1" smtClean="0"/>
-              <a:t>g</a:t>
-            </a:r>
-            <a:r>
-              <a:rPr lang="en-US" dirty="0" smtClean="0"/>
-              <a:t>, 83% in this case</a:t>
-            </a:r>
-          </a:p>
-          <a:p>
-            <a:r>
-              <a:rPr lang="en-US" dirty="0" smtClean="0"/>
-              <a:t>Code that is never executed by a test, might have bugs</a:t>
-            </a:r>
-            <a:endParaRPr lang="en-US" dirty="0"/>
-          </a:p>
-        </p:txBody>
-      </p:sp>
-      <p:pic>
-        <p:nvPicPr>
-          <p:cNvPr id="4" name="Picture 3"/>
-          <p:cNvPicPr>
-            <a:picLocks noChangeAspect="1"/>
-          </p:cNvPicPr>
-          <p:nvPr/>
-        </p:nvPicPr>
-        <p:blipFill>
-          <a:blip r:embed="rId2"/>
-          <a:stretch>
-            <a:fillRect/>
-          </a:stretch>
-        </p:blipFill>
-        <p:spPr>
-          <a:xfrm>
-            <a:off x="188091" y="2324100"/>
-            <a:ext cx="9143787" cy="6565900"/>
-          </a:xfrm>
-          <a:prstGeom prst="rect">
-            <a:avLst/>
-          </a:prstGeom>
-        </p:spPr>
-      </p:pic>
-    </p:spTree>
-    <p:extLst>
-      <p:ext uri="{BB962C8B-B14F-4D97-AF65-F5344CB8AC3E}">
-        <p14:creationId xmlns:p14="http://schemas.microsoft.com/office/powerpoint/2010/main" val="844312714"/>
-      </p:ext>
-    </p:extLst>
-  </p:cSld>
-  <p:clrMapOvr>
-    <a:masterClrMapping/>
-  </p:clrMapOvr>
-  <p:transition spd="med"/>
-</p:sld>
-</file>
-
-<file path=ppt/slides/slide41.xml><?xml version="1.0" encoding="utf-8"?>
-<p:sld xmlns:a="http://schemas.openxmlformats.org/drawingml/2006/main" xmlns:r="http://schemas.openxmlformats.org/officeDocument/2006/relationships" xmlns:p="http://schemas.openxmlformats.org/presentationml/2006/main">
-  <p:cSld>
-    <p:spTree>
-      <p:nvGrpSpPr>
-        <p:cNvPr id="1" name=""/>
-        <p:cNvGrpSpPr/>
-        <p:nvPr/>
-      </p:nvGrpSpPr>
-      <p:grpSpPr>
-        <a:xfrm>
-          <a:off x="0" y="0"/>
-          <a:ext cx="0" cy="0"/>
-          <a:chOff x="0" y="0"/>
-          <a:chExt cx="0" cy="0"/>
-        </a:xfrm>
-      </p:grpSpPr>
-      <p:sp>
-        <p:nvSpPr>
-          <p:cNvPr id="2" name="Title 1"/>
-          <p:cNvSpPr>
-            <a:spLocks noGrp="1"/>
-          </p:cNvSpPr>
-          <p:nvPr>
-            <p:ph type="title"/>
-          </p:nvPr>
-        </p:nvSpPr>
-        <p:spPr/>
-        <p:txBody>
-          <a:bodyPr/>
-          <a:lstStyle/>
-          <a:p>
-            <a:r>
-              <a:rPr lang="en-US" dirty="0" smtClean="0"/>
-              <a:t>Debugging</a:t>
-            </a:r>
-            <a:endParaRPr lang="en-US" dirty="0"/>
-          </a:p>
-        </p:txBody>
-      </p:sp>
-      <p:sp>
-        <p:nvSpPr>
-          <p:cNvPr id="3" name="Text Placeholder 2"/>
-          <p:cNvSpPr>
-            <a:spLocks noGrp="1"/>
-          </p:cNvSpPr>
-          <p:nvPr>
-            <p:ph type="body" idx="1"/>
-          </p:nvPr>
-        </p:nvSpPr>
-        <p:spPr>
-          <a:xfrm>
-            <a:off x="7336052" y="2603500"/>
-            <a:ext cx="5437268" cy="6870438"/>
-          </a:xfrm>
-        </p:spPr>
-        <p:txBody>
-          <a:bodyPr/>
-          <a:lstStyle/>
-          <a:p>
-            <a:r>
-              <a:rPr lang="en-US" b="1" dirty="0" smtClean="0"/>
-              <a:t>VERY IMPORTANT</a:t>
-            </a:r>
-          </a:p>
-          <a:p>
-            <a:r>
-              <a:rPr lang="en-US" dirty="0" smtClean="0"/>
-              <a:t>Can put “</a:t>
-            </a:r>
-            <a:r>
-              <a:rPr lang="en-US" i="1" dirty="0" smtClean="0"/>
-              <a:t>break points</a:t>
-            </a:r>
-            <a:r>
-              <a:rPr lang="en-US" dirty="0" smtClean="0"/>
-              <a:t>”</a:t>
-            </a:r>
-          </a:p>
-          <a:p>
-            <a:r>
-              <a:rPr lang="en-US" dirty="0" smtClean="0"/>
-              <a:t>Execute one step at a time</a:t>
-            </a:r>
-          </a:p>
-          <a:p>
-            <a:r>
-              <a:rPr lang="en-US" dirty="0" smtClean="0"/>
-              <a:t>Inspect status of all variables, at each step</a:t>
-            </a:r>
-          </a:p>
-          <a:p>
-            <a:r>
-              <a:rPr lang="en-US" dirty="0" smtClean="0"/>
-              <a:t>Easier to understand with live demo</a:t>
-            </a:r>
-            <a:endParaRPr lang="en-US" dirty="0"/>
-          </a:p>
-        </p:txBody>
-      </p:sp>
-      <p:pic>
-        <p:nvPicPr>
-          <p:cNvPr id="4" name="Picture 3"/>
-          <p:cNvPicPr>
-            <a:picLocks noChangeAspect="1"/>
-          </p:cNvPicPr>
-          <p:nvPr/>
-        </p:nvPicPr>
-        <p:blipFill>
-          <a:blip r:embed="rId2"/>
-          <a:stretch>
-            <a:fillRect/>
-          </a:stretch>
-        </p:blipFill>
-        <p:spPr>
-          <a:xfrm>
-            <a:off x="472180" y="2603500"/>
-            <a:ext cx="6383552" cy="6959600"/>
-          </a:xfrm>
-          <a:prstGeom prst="rect">
-            <a:avLst/>
-          </a:prstGeom>
-        </p:spPr>
-      </p:pic>
-    </p:spTree>
-    <p:extLst>
-      <p:ext uri="{BB962C8B-B14F-4D97-AF65-F5344CB8AC3E}">
-        <p14:creationId xmlns:p14="http://schemas.microsoft.com/office/powerpoint/2010/main" val="2427230543"/>
       </p:ext>
     </p:extLst>
   </p:cSld>
@@ -11902,6 +11822,272 @@
           <a:p>
             <a:r>
               <a:rPr lang="en-US" dirty="0" smtClean="0"/>
+              <a:t>Run With Coverage</a:t>
+            </a:r>
+            <a:endParaRPr lang="en-US" dirty="0"/>
+          </a:p>
+        </p:txBody>
+      </p:sp>
+      <p:sp>
+        <p:nvSpPr>
+          <p:cNvPr id="3" name="Text Placeholder 2"/>
+          <p:cNvSpPr>
+            <a:spLocks noGrp="1"/>
+          </p:cNvSpPr>
+          <p:nvPr>
+            <p:ph type="body" idx="1"/>
+          </p:nvPr>
+        </p:nvSpPr>
+        <p:spPr>
+          <a:xfrm>
+            <a:off x="9658350" y="2603500"/>
+            <a:ext cx="2971800" cy="6286500"/>
+          </a:xfrm>
+        </p:spPr>
+        <p:txBody>
+          <a:bodyPr>
+            <a:normAutofit fontScale="92500" lnSpcReduction="10000"/>
+          </a:bodyPr>
+          <a:lstStyle/>
+          <a:p>
+            <a:r>
+              <a:rPr lang="en-US" dirty="0" smtClean="0"/>
+              <a:t>Can tell you how much of the code is executed</a:t>
+            </a:r>
+          </a:p>
+          <a:p>
+            <a:r>
+              <a:rPr lang="en-US" dirty="0" err="1"/>
+              <a:t>E</a:t>
+            </a:r>
+            <a:r>
+              <a:rPr lang="en-US" dirty="0" err="1" smtClean="0"/>
+              <a:t>g</a:t>
+            </a:r>
+            <a:r>
+              <a:rPr lang="en-US" dirty="0" smtClean="0"/>
+              <a:t>, 83% in this case</a:t>
+            </a:r>
+          </a:p>
+          <a:p>
+            <a:r>
+              <a:rPr lang="en-US" dirty="0" smtClean="0"/>
+              <a:t>Code that is never executed by a test, might have bugs</a:t>
+            </a:r>
+            <a:endParaRPr lang="en-US" dirty="0"/>
+          </a:p>
+        </p:txBody>
+      </p:sp>
+      <p:pic>
+        <p:nvPicPr>
+          <p:cNvPr id="4" name="Picture 3"/>
+          <p:cNvPicPr>
+            <a:picLocks noChangeAspect="1"/>
+          </p:cNvPicPr>
+          <p:nvPr/>
+        </p:nvPicPr>
+        <p:blipFill>
+          <a:blip r:embed="rId2"/>
+          <a:stretch>
+            <a:fillRect/>
+          </a:stretch>
+        </p:blipFill>
+        <p:spPr>
+          <a:xfrm>
+            <a:off x="188091" y="2324100"/>
+            <a:ext cx="9143787" cy="6565900"/>
+          </a:xfrm>
+          <a:prstGeom prst="rect">
+            <a:avLst/>
+          </a:prstGeom>
+        </p:spPr>
+      </p:pic>
+    </p:spTree>
+    <p:extLst>
+      <p:ext uri="{BB962C8B-B14F-4D97-AF65-F5344CB8AC3E}">
+        <p14:creationId xmlns:p14="http://schemas.microsoft.com/office/powerpoint/2010/main" val="844312714"/>
+      </p:ext>
+    </p:extLst>
+  </p:cSld>
+  <p:clrMapOvr>
+    <a:masterClrMapping/>
+  </p:clrMapOvr>
+  <p:transition spd="med"/>
+</p:sld>
+</file>
+
+<file path=ppt/slides/slide43.xml><?xml version="1.0" encoding="utf-8"?>
+<p:sld xmlns:a="http://schemas.openxmlformats.org/drawingml/2006/main" xmlns:r="http://schemas.openxmlformats.org/officeDocument/2006/relationships" xmlns:p="http://schemas.openxmlformats.org/presentationml/2006/main">
+  <p:cSld>
+    <p:spTree>
+      <p:nvGrpSpPr>
+        <p:cNvPr id="1" name=""/>
+        <p:cNvGrpSpPr/>
+        <p:nvPr/>
+      </p:nvGrpSpPr>
+      <p:grpSpPr>
+        <a:xfrm>
+          <a:off x="0" y="0"/>
+          <a:ext cx="0" cy="0"/>
+          <a:chOff x="0" y="0"/>
+          <a:chExt cx="0" cy="0"/>
+        </a:xfrm>
+      </p:grpSpPr>
+      <p:sp>
+        <p:nvSpPr>
+          <p:cNvPr id="2" name="Title 1"/>
+          <p:cNvSpPr>
+            <a:spLocks noGrp="1"/>
+          </p:cNvSpPr>
+          <p:nvPr>
+            <p:ph type="title"/>
+          </p:nvPr>
+        </p:nvSpPr>
+        <p:spPr/>
+        <p:txBody>
+          <a:bodyPr/>
+          <a:lstStyle/>
+          <a:p>
+            <a:r>
+              <a:rPr lang="en-US" dirty="0" smtClean="0"/>
+              <a:t>Debugging</a:t>
+            </a:r>
+            <a:endParaRPr lang="en-US" dirty="0"/>
+          </a:p>
+        </p:txBody>
+      </p:sp>
+      <p:sp>
+        <p:nvSpPr>
+          <p:cNvPr id="3" name="Text Placeholder 2"/>
+          <p:cNvSpPr>
+            <a:spLocks noGrp="1"/>
+          </p:cNvSpPr>
+          <p:nvPr>
+            <p:ph type="body" idx="1"/>
+          </p:nvPr>
+        </p:nvSpPr>
+        <p:spPr>
+          <a:xfrm>
+            <a:off x="7336052" y="2603500"/>
+            <a:ext cx="5437268" cy="6870438"/>
+          </a:xfrm>
+        </p:spPr>
+        <p:txBody>
+          <a:bodyPr/>
+          <a:lstStyle/>
+          <a:p>
+            <a:r>
+              <a:rPr lang="en-US" b="1" dirty="0" smtClean="0"/>
+              <a:t>VERY IMPORTANT</a:t>
+            </a:r>
+          </a:p>
+          <a:p>
+            <a:r>
+              <a:rPr lang="en-US" dirty="0" smtClean="0"/>
+              <a:t>Can put “</a:t>
+            </a:r>
+            <a:r>
+              <a:rPr lang="en-US" i="1" dirty="0" smtClean="0"/>
+              <a:t>break points</a:t>
+            </a:r>
+            <a:r>
+              <a:rPr lang="en-US" dirty="0" smtClean="0"/>
+              <a:t>”</a:t>
+            </a:r>
+          </a:p>
+          <a:p>
+            <a:r>
+              <a:rPr lang="en-US" dirty="0" smtClean="0"/>
+              <a:t>Execute one step at a time</a:t>
+            </a:r>
+          </a:p>
+          <a:p>
+            <a:r>
+              <a:rPr lang="en-US" dirty="0" smtClean="0"/>
+              <a:t>Inspect status of all variables, at each step</a:t>
+            </a:r>
+          </a:p>
+          <a:p>
+            <a:r>
+              <a:rPr lang="en-US" dirty="0" smtClean="0"/>
+              <a:t>Easier to understand with live demo</a:t>
+            </a:r>
+            <a:endParaRPr lang="en-US" dirty="0"/>
+          </a:p>
+        </p:txBody>
+      </p:sp>
+      <p:pic>
+        <p:nvPicPr>
+          <p:cNvPr id="4" name="Picture 3"/>
+          <p:cNvPicPr>
+            <a:picLocks noChangeAspect="1"/>
+          </p:cNvPicPr>
+          <p:nvPr/>
+        </p:nvPicPr>
+        <p:blipFill>
+          <a:blip r:embed="rId2"/>
+          <a:stretch>
+            <a:fillRect/>
+          </a:stretch>
+        </p:blipFill>
+        <p:spPr>
+          <a:xfrm>
+            <a:off x="472180" y="2603500"/>
+            <a:ext cx="6383552" cy="6959600"/>
+          </a:xfrm>
+          <a:prstGeom prst="rect">
+            <a:avLst/>
+          </a:prstGeom>
+        </p:spPr>
+      </p:pic>
+    </p:spTree>
+    <p:extLst>
+      <p:ext uri="{BB962C8B-B14F-4D97-AF65-F5344CB8AC3E}">
+        <p14:creationId xmlns:p14="http://schemas.microsoft.com/office/powerpoint/2010/main" val="2427230543"/>
+      </p:ext>
+    </p:extLst>
+  </p:cSld>
+  <p:clrMapOvr>
+    <a:masterClrMapping/>
+  </p:clrMapOvr>
+  <p:transition spd="med"/>
+</p:sld>
+</file>
+
+<file path=ppt/slides/slide44.xml><?xml version="1.0" encoding="utf-8"?>
+<p:sld xmlns:a="http://schemas.openxmlformats.org/drawingml/2006/main" xmlns:r="http://schemas.openxmlformats.org/officeDocument/2006/relationships" xmlns:p="http://schemas.openxmlformats.org/presentationml/2006/main">
+  <p:cSld>
+    <p:spTree>
+      <p:nvGrpSpPr>
+        <p:cNvPr id="1" name=""/>
+        <p:cNvGrpSpPr/>
+        <p:nvPr/>
+      </p:nvGrpSpPr>
+      <p:grpSpPr>
+        <a:xfrm>
+          <a:off x="0" y="0"/>
+          <a:ext cx="0" cy="0"/>
+          <a:chOff x="0" y="0"/>
+          <a:chExt cx="0" cy="0"/>
+        </a:xfrm>
+      </p:grpSpPr>
+      <p:sp>
+        <p:nvSpPr>
+          <p:cNvPr id="2" name="Title 1"/>
+          <p:cNvSpPr>
+            <a:spLocks noGrp="1"/>
+          </p:cNvSpPr>
+          <p:nvPr>
+            <p:ph type="title"/>
+          </p:nvPr>
+        </p:nvSpPr>
+        <p:spPr/>
+        <p:txBody>
+          <a:bodyPr/>
+          <a:lstStyle/>
+          <a:p>
+            <a:r>
+              <a:rPr lang="en-US" dirty="0" smtClean="0"/>
               <a:t>TODO</a:t>
             </a:r>
             <a:endParaRPr lang="en-US" dirty="0"/>
@@ -11941,7 +12127,7 @@
 </p:sld>
 </file>
 
-<file path=ppt/slides/slide43.xml><?xml version="1.0" encoding="utf-8"?>
+<file path=ppt/slides/slide45.xml><?xml version="1.0" encoding="utf-8"?>
 <p:sld xmlns:a="http://schemas.openxmlformats.org/drawingml/2006/main" xmlns:r="http://schemas.openxmlformats.org/officeDocument/2006/relationships" xmlns:p="http://schemas.openxmlformats.org/presentationml/2006/main">
   <p:cSld>
     <p:spTree>
@@ -12134,8 +12320,9 @@
             </a:pPr>
             <a:r>
               <a:rPr lang="en-US" dirty="0" smtClean="0"/>
-              <a:t>Intro</a:t>
-            </a:r>
+              <a:t>Arrays/Lists/Tests</a:t>
+            </a:r>
+            <a:endParaRPr lang="en-US" dirty="0" smtClean="0"/>
           </a:p>
           <a:p>
             <a:pPr marL="742950" indent="-742950">
@@ -12173,8 +12360,9 @@
             </a:pPr>
             <a:r>
               <a:rPr lang="en-US" dirty="0" smtClean="0"/>
-              <a:t>Advanced Sorting</a:t>
-            </a:r>
+              <a:t>Recursion and TDD</a:t>
+            </a:r>
+            <a:endParaRPr lang="en-US" dirty="0" smtClean="0"/>
           </a:p>
           <a:p>
             <a:pPr marL="742950" indent="-742950">
@@ -12264,7 +12452,7 @@
           </a:ln>
           <a:extLst>
             <a:ext uri="{C572A759-6A51-4108-AA02-DFA0A04FC94B}">
-              <ma14:wrappingTextBoxFlag xmlns="" xmlns:ma14="http://schemas.microsoft.com/office/mac/drawingml/2011/main" val="1"/>
+              <ma14:wrappingTextBoxFlag xmlns:ma14="http://schemas.microsoft.com/office/mac/drawingml/2011/main" xmlns="" val="1"/>
             </a:ext>
           </a:extLst>
         </p:spPr>
@@ -12601,7 +12789,7 @@
           </a:ln>
           <a:extLst>
             <a:ext uri="{C572A759-6A51-4108-AA02-DFA0A04FC94B}">
-              <ma14:wrappingTextBoxFlag xmlns="" xmlns:ma14="http://schemas.microsoft.com/office/mac/drawingml/2011/main" val="1"/>
+              <ma14:wrappingTextBoxFlag xmlns:ma14="http://schemas.microsoft.com/office/mac/drawingml/2011/main" xmlns="" val="1"/>
             </a:ext>
           </a:extLst>
         </p:spPr>

</xml_diff>

<commit_message>
moving to Java 11
</commit_message>
<xml_diff>
--- a/docs/slides/01/01_intro.pptx
+++ b/docs/slides/01/01_intro.pptx
@@ -1245,7 +1245,7 @@
           <a:p>
             <a:fld id="{04F1D4A2-813C-F741-B481-C92B3A596030}" type="datetimeFigureOut">
               <a:rPr lang="en-US" smtClean="0"/>
-              <a:t>04-Jun-19</a:t>
+              <a:t>11-Jun-19</a:t>
             </a:fld>
             <a:endParaRPr lang="en-US"/>
           </a:p>
@@ -2520,7 +2520,7 @@
           </a:ln>
           <a:extLst>
             <a:ext uri="{C572A759-6A51-4108-AA02-DFA0A04FC94B}">
-              <ma14:wrappingTextBoxFlag xmlns:ma14="http://schemas.microsoft.com/office/mac/drawingml/2011/main" xmlns="" val="1"/>
+              <ma14:wrappingTextBoxFlag xmlns="" xmlns:ma14="http://schemas.microsoft.com/office/mac/drawingml/2011/main" val="1"/>
             </a:ext>
           </a:extLst>
         </p:spPr>
@@ -2559,7 +2559,7 @@
           </a:ln>
           <a:extLst>
             <a:ext uri="{C572A759-6A51-4108-AA02-DFA0A04FC94B}">
-              <ma14:wrappingTextBoxFlag xmlns:ma14="http://schemas.microsoft.com/office/mac/drawingml/2011/main" xmlns="" val="1"/>
+              <ma14:wrappingTextBoxFlag xmlns="" xmlns:ma14="http://schemas.microsoft.com/office/mac/drawingml/2011/main" val="1"/>
             </a:ext>
           </a:extLst>
         </p:spPr>
@@ -4601,8 +4601,8 @@
               <a:t>Java </a:t>
             </a:r>
             <a:r>
-              <a:rPr dirty="0" smtClean="0"/>
-              <a:t>8</a:t>
+              <a:rPr lang="en-US" b="1" dirty="0" smtClean="0"/>
+              <a:t>11</a:t>
             </a:r>
             <a:r>
               <a:rPr lang="en-US" dirty="0" smtClean="0"/>
@@ -4613,27 +4613,52 @@
             <a:pPr lvl="1"/>
             <a:r>
               <a:rPr lang="en-US" dirty="0" smtClean="0"/>
-              <a:t>JDK 11 will come out during the course, so will not use it this year</a:t>
-            </a:r>
-          </a:p>
-          <a:p>
-            <a:pPr lvl="1"/>
-            <a:r>
-              <a:rPr lang="en-US" dirty="0" smtClean="0"/>
-              <a:t>JDK 9 and 10 should be avoided, as non-LTS (Long-Term-Support), and having lifespan of just 6 months</a:t>
-            </a:r>
-            <a:endParaRPr dirty="0"/>
-          </a:p>
-          <a:p>
-            <a:r>
-              <a:rPr dirty="0" smtClean="0"/>
+              <a:t>use </a:t>
+            </a:r>
+            <a:r>
+              <a:rPr lang="en-US" i="1" dirty="0" err="1" smtClean="0"/>
+              <a:t>OpenJDK</a:t>
+            </a:r>
+            <a:r>
+              <a:rPr lang="en-US" dirty="0" smtClean="0"/>
+              <a:t>, </a:t>
+            </a:r>
+            <a:r>
+              <a:rPr lang="en-US" dirty="0" err="1" smtClean="0"/>
+              <a:t>eg</a:t>
+            </a:r>
+            <a:r>
+              <a:rPr lang="en-US" dirty="0" smtClean="0"/>
+              <a:t> </a:t>
+            </a:r>
+            <a:r>
+              <a:rPr lang="en-US" dirty="0"/>
+              <a:t>downloaded from </a:t>
+            </a:r>
+            <a:r>
+              <a:rPr lang="en-US" dirty="0">
+                <a:hlinkClick r:id="rId2"/>
+              </a:rPr>
+              <a:t>https://adoptopenjdk.net</a:t>
+            </a:r>
+            <a:r>
+              <a:rPr lang="en-US" dirty="0" smtClean="0">
+                <a:hlinkClick r:id="rId2"/>
+              </a:rPr>
+              <a:t>/</a:t>
+            </a:r>
+            <a:endParaRPr lang="en-US" dirty="0" smtClean="0"/>
+          </a:p>
+          <a:p>
+            <a:r>
+              <a:rPr i="1" dirty="0" err="1" smtClean="0"/>
               <a:t>Git</a:t>
             </a:r>
-            <a:endParaRPr lang="en-US" dirty="0" smtClean="0"/>
-          </a:p>
-          <a:p>
-            <a:r>
-              <a:rPr lang="en-US" dirty="0" smtClean="0"/>
+            <a:endParaRPr lang="en-US" i="1" dirty="0" smtClean="0"/>
+          </a:p>
+          <a:p>
+            <a:r>
+              <a:rPr lang="en-US" i="1" dirty="0" smtClean="0"/>
               <a:t>IntelliJ Ultimate Edition</a:t>
             </a:r>
           </a:p>
@@ -4907,7 +4932,7 @@
           </a:ln>
           <a:extLst>
             <a:ext uri="{C572A759-6A51-4108-AA02-DFA0A04FC94B}">
-              <ma14:wrappingTextBoxFlag xmlns="" xmlns:ma14="http://schemas.microsoft.com/office/mac/drawingml/2011/main" val="1"/>
+              <ma14:wrappingTextBoxFlag xmlns:ma14="http://schemas.microsoft.com/office/mac/drawingml/2011/main" xmlns="" val="1"/>
             </a:ext>
           </a:extLst>
         </p:spPr>
@@ -7442,11 +7467,7 @@
             </a:r>
             <a:r>
               <a:rPr lang="en-US" dirty="0" smtClean="0"/>
-              <a:t>, you can add as many elements as you want, as long as you have enough </a:t>
-            </a:r>
-            <a:r>
-              <a:rPr lang="en-US" dirty="0" smtClean="0"/>
-              <a:t>memory</a:t>
+              <a:t>, you can add as many elements as you want, as long as you have enough memory</a:t>
             </a:r>
           </a:p>
           <a:p>
@@ -7465,18 +7486,12 @@
               <a:rPr lang="en-US" dirty="0" smtClean="0"/>
               <a:t>can have duplicates</a:t>
             </a:r>
-            <a:endParaRPr lang="en-US" dirty="0" smtClean="0"/>
-          </a:p>
-          <a:p>
-            <a:r>
-              <a:rPr lang="en-US" dirty="0" smtClean="0"/>
-              <a:t>Lists (and all data structures will see in this course) are Java objects, and not treated specially like </a:t>
-            </a:r>
-            <a:r>
-              <a:rPr lang="en-US" dirty="0" smtClean="0"/>
-              <a:t>arrays</a:t>
-            </a:r>
-            <a:endParaRPr lang="en-US" dirty="0" smtClean="0"/>
+          </a:p>
+          <a:p>
+            <a:r>
+              <a:rPr lang="en-US" dirty="0" smtClean="0"/>
+              <a:t>Lists (and all data structures will see in this course) are Java objects, and not treated specially like arrays</a:t>
+            </a:r>
           </a:p>
         </p:txBody>
       </p:sp>
@@ -8533,11 +8548,7 @@
             </a:r>
             <a:r>
               <a:rPr lang="en-US" dirty="0" smtClean="0"/>
-              <a:t> for each element (they are objects</a:t>
-            </a:r>
-            <a:r>
-              <a:rPr lang="en-US" dirty="0" smtClean="0"/>
-              <a:t>)</a:t>
+              <a:t> for each element (they are objects)</a:t>
             </a:r>
           </a:p>
           <a:p>
@@ -8552,11 +8563,7 @@
             </a:r>
             <a:r>
               <a:rPr lang="en-US" dirty="0" smtClean="0"/>
-              <a:t> </a:t>
-            </a:r>
-            <a:r>
-              <a:rPr lang="en-US" dirty="0" smtClean="0"/>
-              <a:t>from node to node (</a:t>
+              <a:t> from node to node (</a:t>
             </a:r>
             <a:r>
               <a:rPr lang="en-US" dirty="0" err="1" smtClean="0"/>
@@ -8572,11 +8579,7 @@
             </a:r>
             <a:r>
               <a:rPr lang="en-US" dirty="0" smtClean="0"/>
-              <a:t> field</a:t>
-            </a:r>
-            <a:r>
-              <a:rPr lang="en-US" dirty="0" smtClean="0"/>
-              <a:t>)</a:t>
+              <a:t> field)</a:t>
             </a:r>
           </a:p>
           <a:p>
@@ -8613,7 +8616,6 @@
               <a:rPr lang="en-US" dirty="0" smtClean="0"/>
               <a:t>list</a:t>
             </a:r>
-            <a:endParaRPr lang="en-US" dirty="0" smtClean="0"/>
           </a:p>
           <a:p>
             <a:pPr>
@@ -14239,7 +14241,6 @@
               <a:rPr lang="en-US" dirty="0" smtClean="0"/>
               <a:t>Arrays/Lists/Tests</a:t>
             </a:r>
-            <a:endParaRPr lang="en-US" dirty="0" smtClean="0"/>
           </a:p>
           <a:p>
             <a:pPr marL="742950" indent="-742950">
@@ -14279,7 +14280,6 @@
               <a:rPr lang="en-US" dirty="0" smtClean="0"/>
               <a:t>Recursion and TDD</a:t>
             </a:r>
-            <a:endParaRPr lang="en-US" dirty="0" smtClean="0"/>
           </a:p>
           <a:p>
             <a:pPr marL="742950" indent="-742950">
@@ -14369,7 +14369,7 @@
           </a:ln>
           <a:extLst>
             <a:ext uri="{C572A759-6A51-4108-AA02-DFA0A04FC94B}">
-              <ma14:wrappingTextBoxFlag xmlns:ma14="http://schemas.microsoft.com/office/mac/drawingml/2011/main" xmlns="" val="1"/>
+              <ma14:wrappingTextBoxFlag xmlns="" xmlns:ma14="http://schemas.microsoft.com/office/mac/drawingml/2011/main" val="1"/>
             </a:ext>
           </a:extLst>
         </p:spPr>
@@ -14706,7 +14706,7 @@
           </a:ln>
           <a:extLst>
             <a:ext uri="{C572A759-6A51-4108-AA02-DFA0A04FC94B}">
-              <ma14:wrappingTextBoxFlag xmlns:ma14="http://schemas.microsoft.com/office/mac/drawingml/2011/main" xmlns="" val="1"/>
+              <ma14:wrappingTextBoxFlag xmlns="" xmlns:ma14="http://schemas.microsoft.com/office/mac/drawingml/2011/main" val="1"/>
             </a:ext>
           </a:extLst>
         </p:spPr>

</xml_diff>